<commit_message>
update slides of 2022A setsumeikai
</commit_message>
<xml_diff>
--- a/events/2022-09-14/slides/04-slack.pptx
+++ b/events/2022-09-14/slides/04-slack.pptx
@@ -1,11 +1,11 @@
 
 <file path=ppt/presentation.xml><?xml version="1.0" encoding="utf-8"?>
-<p:presentation xmlns:a="http://schemas.openxmlformats.org/drawingml/2006/main" xmlns:r="http://schemas.openxmlformats.org/officeDocument/2006/relationships" xmlns:p="http://schemas.openxmlformats.org/presentationml/2006/main" saveSubsetFonts="1">
+<p:presentation xmlns:a="http://schemas.openxmlformats.org/drawingml/2006/main" xmlns:r="http://schemas.openxmlformats.org/officeDocument/2006/relationships" xmlns:p="http://schemas.openxmlformats.org/presentationml/2006/main" removePersonalInfoOnSave="1" saveSubsetFonts="1">
   <p:sldMasterIdLst>
     <p:sldMasterId id="2147483672" r:id="rId1"/>
   </p:sldMasterIdLst>
   <p:notesMasterIdLst>
-    <p:notesMasterId r:id="rId23"/>
+    <p:notesMasterId r:id="rId25"/>
   </p:notesMasterIdLst>
   <p:sldIdLst>
     <p:sldId id="256" r:id="rId2"/>
@@ -17,18 +17,20 @@
     <p:sldId id="282" r:id="rId8"/>
     <p:sldId id="259" r:id="rId9"/>
     <p:sldId id="279" r:id="rId10"/>
-    <p:sldId id="260" r:id="rId11"/>
-    <p:sldId id="269" r:id="rId12"/>
-    <p:sldId id="280" r:id="rId13"/>
-    <p:sldId id="292" r:id="rId14"/>
-    <p:sldId id="271" r:id="rId15"/>
-    <p:sldId id="261" r:id="rId16"/>
-    <p:sldId id="273" r:id="rId17"/>
-    <p:sldId id="274" r:id="rId18"/>
-    <p:sldId id="262" r:id="rId19"/>
-    <p:sldId id="277" r:id="rId20"/>
-    <p:sldId id="281" r:id="rId21"/>
-    <p:sldId id="293" r:id="rId22"/>
+    <p:sldId id="294" r:id="rId11"/>
+    <p:sldId id="260" r:id="rId12"/>
+    <p:sldId id="269" r:id="rId13"/>
+    <p:sldId id="280" r:id="rId14"/>
+    <p:sldId id="292" r:id="rId15"/>
+    <p:sldId id="271" r:id="rId16"/>
+    <p:sldId id="261" r:id="rId17"/>
+    <p:sldId id="273" r:id="rId18"/>
+    <p:sldId id="274" r:id="rId19"/>
+    <p:sldId id="262" r:id="rId20"/>
+    <p:sldId id="277" r:id="rId21"/>
+    <p:sldId id="281" r:id="rId22"/>
+    <p:sldId id="295" r:id="rId23"/>
+    <p:sldId id="293" r:id="rId24"/>
   </p:sldIdLst>
   <p:sldSz cx="12192000" cy="6858000"/>
   <p:notesSz cx="6858000" cy="9144000"/>
@@ -138,9 +140,9 @@
 <file path=ppt/revisionInfo.xml><?xml version="1.0" encoding="utf-8"?>
 <p1510:revInfo xmlns:a="http://schemas.openxmlformats.org/drawingml/2006/main" xmlns:r="http://schemas.openxmlformats.org/officeDocument/2006/relationships" xmlns:p1510="http://schemas.microsoft.com/office/powerpoint/2015/10/main">
   <p1510:revLst>
-    <p1510:client id="{05392762-0902-A041-A6BE-0B1C667348BE}" v="3147" dt="2022-09-12T10:48:48.184"/>
+    <p1510:client id="{05392762-0902-A041-A6BE-0B1C667348BE}" v="3549" dt="2022-09-14T04:55:12.068"/>
     <p1510:client id="{1AF2FABF-8CFD-BF6E-D82B-4CAE5E8AB57D}" v="271" dt="2022-09-13T15:16:39.671"/>
-    <p1510:client id="{CDA4503E-12BE-6F86-00C2-676DCE0786B1}" v="564" dt="2022-09-12T10:33:16.874"/>
+    <p1510:client id="{6E0AC178-307F-355B-D3BC-B7468340FE61}" v="25" dt="2022-09-14T05:02:00.025"/>
   </p1510:revLst>
 </p1510:revInfo>
 </file>
@@ -227,7 +229,7 @@
           <a:p>
             <a:fld id="{F9EBBA44-1729-EA47-AEC3-82950285FACF}" type="datetimeFigureOut">
               <a:rPr kumimoji="1" lang="ja-JP" altLang="en-US" smtClean="0"/>
-              <a:t>2022/9/13</a:t>
+              <a:t>2023/3/8</a:t>
             </a:fld>
             <a:endParaRPr kumimoji="1" lang="ja-JP" altLang="en-US"/>
           </a:p>
@@ -591,7 +593,7 @@
           <a:p>
             <a:fld id="{09E78C1B-2922-1C45-8720-4FBAA35143B4}" type="slidenum">
               <a:rPr kumimoji="1" lang="ja-JP" altLang="en-US" smtClean="0"/>
-              <a:t>19</a:t>
+              <a:t>20</a:t>
             </a:fld>
             <a:endParaRPr kumimoji="1" lang="ja-JP" altLang="en-US"/>
           </a:p>
@@ -1331,7 +1333,7 @@
             <a:fld id="{B61BEF0D-F0BB-DE4B-95CE-6DB70DBA9567}" type="datetimeFigureOut">
               <a:rPr lang="en-US" dirty="0"/>
               <a:pPr/>
-              <a:t>9/13/2022</a:t>
+              <a:t>3/8/2023</a:t>
             </a:fld>
             <a:endParaRPr lang="en-US"/>
           </a:p>
@@ -1583,7 +1585,7 @@
             <a:fld id="{B61BEF0D-F0BB-DE4B-95CE-6DB70DBA9567}" type="datetimeFigureOut">
               <a:rPr lang="en-US" dirty="0"/>
               <a:pPr/>
-              <a:t>9/13/2022</a:t>
+              <a:t>3/8/2023</a:t>
             </a:fld>
             <a:endParaRPr lang="en-US"/>
           </a:p>
@@ -1898,7 +1900,7 @@
             <a:fld id="{B61BEF0D-F0BB-DE4B-95CE-6DB70DBA9567}" type="datetimeFigureOut">
               <a:rPr lang="en-US" dirty="0"/>
               <a:pPr/>
-              <a:t>9/13/2022</a:t>
+              <a:t>3/8/2023</a:t>
             </a:fld>
             <a:endParaRPr lang="en-US"/>
           </a:p>
@@ -2240,7 +2242,7 @@
             <a:fld id="{B61BEF0D-F0BB-DE4B-95CE-6DB70DBA9567}" type="datetimeFigureOut">
               <a:rPr lang="en-US" dirty="0"/>
               <a:pPr/>
-              <a:t>9/13/2022</a:t>
+              <a:t>3/8/2023</a:t>
             </a:fld>
             <a:endParaRPr lang="en-US"/>
           </a:p>
@@ -2555,7 +2557,7 @@
             <a:fld id="{B61BEF0D-F0BB-DE4B-95CE-6DB70DBA9567}" type="datetimeFigureOut">
               <a:rPr lang="en-US" dirty="0"/>
               <a:pPr/>
-              <a:t>9/13/2022</a:t>
+              <a:t>3/8/2023</a:t>
             </a:fld>
             <a:endParaRPr lang="en-US"/>
           </a:p>
@@ -2949,7 +2951,7 @@
             <a:fld id="{B61BEF0D-F0BB-DE4B-95CE-6DB70DBA9567}" type="datetimeFigureOut">
               <a:rPr lang="en-US" dirty="0"/>
               <a:pPr/>
-              <a:t>9/13/2022</a:t>
+              <a:t>3/8/2023</a:t>
             </a:fld>
             <a:endParaRPr lang="en-US"/>
           </a:p>
@@ -3118,7 +3120,7 @@
           <a:p>
             <a:fld id="{55C6B4A9-1611-4792-9094-5F34BCA07E0B}" type="datetimeFigureOut">
               <a:rPr lang="en-US" dirty="0"/>
-              <a:t>9/13/2022</a:t>
+              <a:t>3/8/2023</a:t>
             </a:fld>
             <a:endParaRPr lang="en-US"/>
           </a:p>
@@ -3297,7 +3299,7 @@
             <a:fld id="{B61BEF0D-F0BB-DE4B-95CE-6DB70DBA9567}" type="datetimeFigureOut">
               <a:rPr lang="en-US" dirty="0"/>
               <a:pPr/>
-              <a:t>9/13/2022</a:t>
+              <a:t>3/8/2023</a:t>
             </a:fld>
             <a:endParaRPr lang="en-US"/>
           </a:p>
@@ -3473,7 +3475,7 @@
             <a:fld id="{B61BEF0D-F0BB-DE4B-95CE-6DB70DBA9567}" type="datetimeFigureOut">
               <a:rPr lang="en-US" dirty="0"/>
               <a:pPr/>
-              <a:t>9/13/2022</a:t>
+              <a:t>3/8/2023</a:t>
             </a:fld>
             <a:endParaRPr lang="en-US"/>
           </a:p>
@@ -3721,7 +3723,7 @@
             <a:fld id="{B61BEF0D-F0BB-DE4B-95CE-6DB70DBA9567}" type="datetimeFigureOut">
               <a:rPr lang="en-US" dirty="0"/>
               <a:pPr/>
-              <a:t>9/13/2022</a:t>
+              <a:t>3/8/2023</a:t>
             </a:fld>
             <a:endParaRPr lang="en-US"/>
           </a:p>
@@ -3951,7 +3953,7 @@
           <a:p>
             <a:fld id="{EB712588-04B1-427B-82EE-E8DB90309F08}" type="datetimeFigureOut">
               <a:rPr lang="en-US" dirty="0"/>
-              <a:t>9/13/2022</a:t>
+              <a:t>3/8/2023</a:t>
             </a:fld>
             <a:endParaRPr lang="en-US"/>
           </a:p>
@@ -4323,7 +4325,7 @@
             <a:fld id="{B61BEF0D-F0BB-DE4B-95CE-6DB70DBA9567}" type="datetimeFigureOut">
               <a:rPr lang="en-US" dirty="0"/>
               <a:pPr/>
-              <a:t>9/13/2022</a:t>
+              <a:t>3/8/2023</a:t>
             </a:fld>
             <a:endParaRPr lang="en-US"/>
           </a:p>
@@ -4447,7 +4449,7 @@
             <a:fld id="{B61BEF0D-F0BB-DE4B-95CE-6DB70DBA9567}" type="datetimeFigureOut">
               <a:rPr lang="en-US" dirty="0"/>
               <a:pPr/>
-              <a:t>9/13/2022</a:t>
+              <a:t>3/8/2023</a:t>
             </a:fld>
             <a:endParaRPr lang="en-US"/>
           </a:p>
@@ -4544,7 +4546,7 @@
             <a:fld id="{B61BEF0D-F0BB-DE4B-95CE-6DB70DBA9567}" type="datetimeFigureOut">
               <a:rPr lang="en-US" dirty="0"/>
               <a:pPr/>
-              <a:t>9/13/2022</a:t>
+              <a:t>3/8/2023</a:t>
             </a:fld>
             <a:endParaRPr lang="en-US"/>
           </a:p>
@@ -4798,7 +4800,7 @@
           <a:p>
             <a:fld id="{42A54C80-263E-416B-A8E0-580EDEADCBDC}" type="datetimeFigureOut">
               <a:rPr lang="en-US" dirty="0"/>
-              <a:t>9/13/2022</a:t>
+              <a:t>3/8/2023</a:t>
             </a:fld>
             <a:endParaRPr lang="en-US"/>
           </a:p>
@@ -5057,7 +5059,7 @@
             <a:fld id="{B61BEF0D-F0BB-DE4B-95CE-6DB70DBA9567}" type="datetimeFigureOut">
               <a:rPr lang="en-US" dirty="0"/>
               <a:pPr/>
-              <a:t>9/13/2022</a:t>
+              <a:t>3/8/2023</a:t>
             </a:fld>
             <a:endParaRPr lang="en-US"/>
           </a:p>
@@ -5800,7 +5802,7 @@
             <a:fld id="{B61BEF0D-F0BB-DE4B-95CE-6DB70DBA9567}" type="datetimeFigureOut">
               <a:rPr lang="en-US" dirty="0"/>
               <a:pPr/>
-              <a:t>9/13/2022</a:t>
+              <a:t>3/8/2023</a:t>
             </a:fld>
             <a:endParaRPr lang="en-US"/>
           </a:p>
@@ -6416,6 +6418,213 @@
       </p:grpSpPr>
       <p:sp>
         <p:nvSpPr>
+          <p:cNvPr id="2" name="タイトル 1">
+            <a:extLst>
+              <a:ext uri="{FF2B5EF4-FFF2-40B4-BE49-F238E27FC236}">
+                <a16:creationId xmlns:a16="http://schemas.microsoft.com/office/drawing/2014/main" id="{2DAADC0D-E9EB-3681-2F10-79C7A07C1033}"/>
+              </a:ext>
+            </a:extLst>
+          </p:cNvPr>
+          <p:cNvSpPr>
+            <a:spLocks noGrp="1"/>
+          </p:cNvSpPr>
+          <p:nvPr>
+            <p:ph type="title"/>
+          </p:nvPr>
+        </p:nvSpPr>
+        <p:spPr/>
+        <p:txBody>
+          <a:bodyPr/>
+          <a:lstStyle/>
+          <a:p>
+            <a:r>
+              <a:rPr kumimoji="1" lang="en-US" altLang="ja-JP">
+                <a:ea typeface="メイリオ"/>
+              </a:rPr>
+              <a:t>UTokyo Account</a:t>
+            </a:r>
+            <a:r>
+              <a:rPr kumimoji="1" lang="ja-JP" altLang="en-US">
+                <a:ea typeface="メイリオ"/>
+              </a:rPr>
+              <a:t>の多要素認証が必須です</a:t>
+            </a:r>
+          </a:p>
+        </p:txBody>
+      </p:sp>
+      <p:sp>
+        <p:nvSpPr>
+          <p:cNvPr id="15" name="コンテンツ プレースホルダー 14">
+            <a:extLst>
+              <a:ext uri="{FF2B5EF4-FFF2-40B4-BE49-F238E27FC236}">
+                <a16:creationId xmlns:a16="http://schemas.microsoft.com/office/drawing/2014/main" id="{6BEF4688-9F61-BD57-EC6F-F35505873995}"/>
+              </a:ext>
+            </a:extLst>
+          </p:cNvPr>
+          <p:cNvSpPr>
+            <a:spLocks noGrp="1"/>
+          </p:cNvSpPr>
+          <p:nvPr>
+            <p:ph idx="1"/>
+          </p:nvPr>
+        </p:nvSpPr>
+        <p:spPr>
+          <a:xfrm>
+            <a:off x="677334" y="2160589"/>
+            <a:ext cx="6196563" cy="3880773"/>
+          </a:xfrm>
+        </p:spPr>
+        <p:txBody>
+          <a:bodyPr/>
+          <a:lstStyle/>
+          <a:p>
+            <a:pPr marL="0" indent="0">
+              <a:buNone/>
+            </a:pPr>
+            <a:r>
+              <a:rPr lang="ja-JP" altLang="en-US"/>
+              <a:t>画像のようなエラーが出る場合は多要素認証の問題です。</a:t>
+            </a:r>
+            <a:endParaRPr lang="en-US" altLang="ja-JP"/>
+          </a:p>
+          <a:p>
+            <a:r>
+              <a:rPr lang="ja-JP" altLang="en-US"/>
+              <a:t>多要素認証の初期設定をしてください。</a:t>
+            </a:r>
+            <a:br>
+              <a:rPr lang="en-US" altLang="ja-JP"/>
+            </a:br>
+            <a:r>
+              <a:rPr lang="ja-JP" altLang="en-US"/>
+              <a:t>→</a:t>
+            </a:r>
+            <a:r>
+              <a:rPr lang="en-US" altLang="ja-JP">
+                <a:hlinkClick r:id="rId2"/>
+              </a:rPr>
+              <a:t>UTokyo Account</a:t>
+            </a:r>
+            <a:r>
+              <a:rPr lang="ja-JP" altLang="en-US">
+                <a:hlinkClick r:id="rId2"/>
+              </a:rPr>
+              <a:t>における多要素認証の利用について</a:t>
+            </a:r>
+            <a:endParaRPr lang="en-US" altLang="ja-JP"/>
+          </a:p>
+          <a:p>
+            <a:r>
+              <a:rPr lang="ja-JP" altLang="en-US"/>
+              <a:t>最後の手順</a:t>
+            </a:r>
+            <a:r>
+              <a:rPr lang="en-US" altLang="ja-JP"/>
+              <a:t>4</a:t>
+            </a:r>
+            <a:r>
+              <a:rPr lang="ja-JP" altLang="en-US"/>
+              <a:t>（利用申請）まで確実に行ってください。</a:t>
+            </a:r>
+            <a:endParaRPr lang="en-US" altLang="ja-JP"/>
+          </a:p>
+          <a:p>
+            <a:r>
+              <a:rPr lang="ja-JP" altLang="en-US"/>
+              <a:t>手順の完了後、システム全体に反映されるまで最大約</a:t>
+            </a:r>
+            <a:r>
+              <a:rPr lang="en-US" altLang="ja-JP"/>
+              <a:t>40</a:t>
+            </a:r>
+            <a:r>
+              <a:rPr lang="ja-JP" altLang="en-US"/>
+              <a:t>分かかる</a:t>
+            </a:r>
+            <a:r>
+              <a:rPr lang="ja-JP" altLang="en-US">
+                <a:ea typeface="メイリオ"/>
+              </a:rPr>
+              <a:t>🙇ので</a:t>
+            </a:r>
+            <a:r>
+              <a:rPr lang="ja-JP" altLang="en-US"/>
+              <a:t>、それまで待ってください。</a:t>
+            </a:r>
+            <a:endParaRPr lang="en-US" altLang="ja-JP"/>
+          </a:p>
+          <a:p>
+            <a:endParaRPr lang="ja-JP" altLang="en-US"/>
+          </a:p>
+        </p:txBody>
+      </p:sp>
+      <p:pic>
+        <p:nvPicPr>
+          <p:cNvPr id="16" name="コンテンツ プレースホルダー 12">
+            <a:extLst>
+              <a:ext uri="{FF2B5EF4-FFF2-40B4-BE49-F238E27FC236}">
+                <a16:creationId xmlns:a16="http://schemas.microsoft.com/office/drawing/2014/main" id="{5A60E09D-75D3-85F6-F948-1CD87B5301DB}"/>
+              </a:ext>
+            </a:extLst>
+          </p:cNvPr>
+          <p:cNvPicPr>
+            <a:picLocks noChangeAspect="1"/>
+          </p:cNvPicPr>
+          <p:nvPr/>
+        </p:nvPicPr>
+        <p:blipFill>
+          <a:blip r:embed="rId3" cstate="print">
+            <a:extLst>
+              <a:ext uri="{28A0092B-C50C-407E-A947-70E740481C1C}">
+                <a14:useLocalDpi xmlns:a14="http://schemas.microsoft.com/office/drawing/2010/main" val="0"/>
+              </a:ext>
+            </a:extLst>
+          </a:blip>
+          <a:srcRect/>
+          <a:stretch/>
+        </p:blipFill>
+        <p:spPr>
+          <a:xfrm>
+            <a:off x="6873897" y="2160589"/>
+            <a:ext cx="5175249" cy="3881436"/>
+          </a:xfrm>
+          <a:prstGeom prst="rect">
+            <a:avLst/>
+          </a:prstGeom>
+        </p:spPr>
+      </p:pic>
+    </p:spTree>
+    <p:extLst>
+      <p:ext uri="{BB962C8B-B14F-4D97-AF65-F5344CB8AC3E}">
+        <p14:creationId xmlns:p14="http://schemas.microsoft.com/office/powerpoint/2010/main" val="1512210409"/>
+      </p:ext>
+    </p:extLst>
+  </p:cSld>
+  <p:clrMapOvr>
+    <a:masterClrMapping/>
+  </p:clrMapOvr>
+</p:sld>
+</file>
+
+<file path=ppt/slides/slide11.xml><?xml version="1.0" encoding="utf-8"?>
+<p:sld xmlns:a="http://schemas.openxmlformats.org/drawingml/2006/main" xmlns:r="http://schemas.openxmlformats.org/officeDocument/2006/relationships" xmlns:p="http://schemas.openxmlformats.org/presentationml/2006/main">
+  <p:cSld>
+    <p:spTree>
+      <p:nvGrpSpPr>
+        <p:cNvPr id="1" name=""/>
+        <p:cNvGrpSpPr/>
+        <p:nvPr/>
+      </p:nvGrpSpPr>
+      <p:grpSpPr>
+        <a:xfrm>
+          <a:off x="0" y="0"/>
+          <a:ext cx="0" cy="0"/>
+          <a:chOff x="0" y="0"/>
+          <a:chExt cx="0" cy="0"/>
+        </a:xfrm>
+      </p:grpSpPr>
+      <p:sp>
+        <p:nvSpPr>
           <p:cNvPr id="4" name="タイトル 3">
             <a:extLst>
               <a:ext uri="{FF2B5EF4-FFF2-40B4-BE49-F238E27FC236}">
@@ -6510,7 +6719,7 @@
 </p:sld>
 </file>
 
-<file path=ppt/slides/slide11.xml><?xml version="1.0" encoding="utf-8"?>
+<file path=ppt/slides/slide12.xml><?xml version="1.0" encoding="utf-8"?>
 <p:sld xmlns:a="http://schemas.openxmlformats.org/drawingml/2006/main" xmlns:r="http://schemas.openxmlformats.org/officeDocument/2006/relationships" xmlns:p="http://schemas.openxmlformats.org/presentationml/2006/main">
   <p:cSld>
     <p:spTree>
@@ -6616,7 +6825,7 @@
               <a:t>学生が中心の活動でも、責任者となる教職員から申請いただければ利用できます。</a:t>
             </a:r>
             <a:br>
-              <a:rPr lang="en-US" altLang="ja-JP" dirty="0"/>
+              <a:rPr lang="en-US" altLang="ja-JP"/>
             </a:br>
             <a:r>
               <a:rPr lang="ja-JP" altLang="en-US">
@@ -6636,7 +6845,7 @@
               <a:t>詳細は</a:t>
             </a:r>
             <a:r>
-              <a:rPr lang="en-US" altLang="ja-JP" dirty="0" err="1">
+              <a:rPr lang="en-US" altLang="ja-JP" err="1">
                 <a:ea typeface="メイリオ"/>
               </a:rPr>
               <a:t>utelecon</a:t>
@@ -6648,7 +6857,7 @@
               <a:t>ポータルサイトに掲載しますので、熟読して申請してください。</a:t>
             </a:r>
             <a:br>
-              <a:rPr lang="en-US" altLang="ja-JP" dirty="0"/>
+              <a:rPr lang="en-US" altLang="ja-JP"/>
             </a:br>
             <a:r>
               <a:rPr lang="ja-JP" altLang="en-US">
@@ -6657,14 +6866,14 @@
               <a:t>→「</a:t>
             </a:r>
             <a:r>
-              <a:rPr lang="en" altLang="ja-JP" dirty="0">
+              <a:rPr lang="en" altLang="ja-JP">
                 <a:ea typeface="メイリオ"/>
                 <a:hlinkClick r:id="rId2"/>
               </a:rPr>
               <a:t>UTokyo Slack</a:t>
             </a:r>
             <a:r>
-              <a:rPr lang="ja-JP" altLang="en-US" dirty="0">
+              <a:rPr lang="ja-JP" altLang="en-US">
                 <a:ea typeface="メイリオ"/>
                 <a:hlinkClick r:id="rId2"/>
               </a:rPr>
@@ -6683,24 +6892,10 @@
           <a:p>
             <a:pPr lvl="1"/>
             <a:r>
-              <a:rPr lang="en-US" altLang="ja-JP" dirty="0">
+              <a:rPr lang="en-US" altLang="ja-JP">
                 <a:ea typeface="メイリオ"/>
               </a:rPr>
               <a:t>既に250個以上のワークスペースの利用がはじまっています。</a:t>
-            </a:r>
-            <a:endParaRPr lang="en-US" altLang="ja-JP" dirty="0">
-              <a:ea typeface="メイリオ"/>
-              <a:cs typeface="Calibri"/>
-            </a:endParaRPr>
-          </a:p>
-          <a:p>
-            <a:pPr lvl="1"/>
-            <a:r>
-              <a:rPr lang="en-US" altLang="ja-JP" dirty="0" err="1">
-                <a:ea typeface="メイリオ"/>
-                <a:cs typeface="Calibri"/>
-              </a:rPr>
-              <a:t>ワークスペースURLの指定にご注意ください</a:t>
             </a:r>
             <a:endParaRPr lang="en-US" altLang="ja-JP">
               <a:ea typeface="メイリオ"/>
@@ -6708,58 +6903,65 @@
             </a:endParaRPr>
           </a:p>
           <a:p>
+            <a:pPr lvl="1"/>
+            <a:r>
+              <a:rPr lang="en-US" altLang="ja-JP" err="1">
+                <a:ea typeface="メイリオ"/>
+                <a:cs typeface="Calibri"/>
+              </a:rPr>
+              <a:t>ワークスペースURLの指定にご注意ください</a:t>
+            </a:r>
+            <a:endParaRPr lang="en-US" altLang="ja-JP">
+              <a:ea typeface="メイリオ"/>
+              <a:cs typeface="Calibri"/>
+            </a:endParaRPr>
+          </a:p>
+          <a:p>
             <a:pPr lvl="2"/>
             <a:r>
-              <a:rPr lang="en-US" altLang="ja-JP" dirty="0" err="1">
+              <a:rPr lang="en-US" altLang="ja-JP">
                 <a:ea typeface="メイリオ"/>
                 <a:cs typeface="Calibri"/>
               </a:rPr>
-              <a:t>英数字と</a:t>
-            </a:r>
-            <a:r>
-              <a:rPr lang="en-US" altLang="ja-JP" dirty="0">
+              <a:t>英小文字、数字と-(</a:t>
+            </a:r>
+            <a:r>
+              <a:rPr lang="en-US" altLang="ja-JP" err="1">
                 <a:ea typeface="メイリオ"/>
                 <a:cs typeface="Calibri" panose="020F0502020204030204"/>
               </a:rPr>
-              <a:t>-(</a:t>
-            </a:r>
-            <a:r>
-              <a:rPr lang="en-US" altLang="ja-JP" dirty="0" err="1">
+              <a:t>ハイフン</a:t>
+            </a:r>
+            <a:r>
+              <a:rPr lang="en-US" altLang="ja-JP">
                 <a:ea typeface="メイリオ"/>
                 <a:cs typeface="Calibri" panose="020F0502020204030204"/>
               </a:rPr>
-              <a:t>ハイフン</a:t>
-            </a:r>
-            <a:r>
-              <a:rPr lang="en-US" altLang="ja-JP" dirty="0">
+              <a:t>)</a:t>
+            </a:r>
+            <a:r>
+              <a:rPr lang="en-US" altLang="ja-JP" err="1">
                 <a:ea typeface="メイリオ"/>
                 <a:cs typeface="Calibri" panose="020F0502020204030204"/>
               </a:rPr>
-              <a:t>)</a:t>
-            </a:r>
-            <a:r>
-              <a:rPr lang="en-US" altLang="ja-JP" dirty="0" err="1">
+              <a:t>以外を入れない</a:t>
+            </a:r>
+            <a:r>
+              <a:rPr lang="en-US" altLang="ja-JP">
                 <a:ea typeface="メイリオ"/>
                 <a:cs typeface="Calibri" panose="020F0502020204030204"/>
               </a:rPr>
-              <a:t>以外を入れない</a:t>
-            </a:r>
-            <a:r>
-              <a:rPr lang="en-US" altLang="ja-JP" dirty="0">
+              <a:t>。</a:t>
+            </a:r>
+          </a:p>
+          <a:p>
+            <a:pPr lvl="2"/>
+            <a:r>
+              <a:rPr lang="en-US" altLang="ja-JP">
                 <a:ea typeface="メイリオ"/>
                 <a:cs typeface="Calibri" panose="020F0502020204030204"/>
               </a:rPr>
-              <a:t>。</a:t>
-            </a:r>
-          </a:p>
-          <a:p>
-            <a:pPr lvl="2"/>
-            <a:r>
-              <a:rPr lang="en-US" altLang="ja-JP" dirty="0">
-                <a:ea typeface="メイリオ"/>
-                <a:cs typeface="Calibri" panose="020F0502020204030204"/>
-              </a:rPr>
-              <a:t>単語1つだけなどは大抵重複します。</a:t>
+              <a:t>単語1つだけなどは大抵取得済みです。</a:t>
             </a:r>
           </a:p>
           <a:p>
@@ -6793,7 +6995,7 @@
             <a:fld id="{7132C4A5-202B-4DA4-9DB0-0994E867E2A1}" type="slidenum">
               <a:rPr lang="ja-JP" altLang="en-US" smtClean="0"/>
               <a:pPr/>
-              <a:t>11</a:t>
+              <a:t>12</a:t>
             </a:fld>
             <a:endParaRPr lang="ja-JP" altLang="en-US"/>
           </a:p>
@@ -6842,323 +7044,6 @@
 </p:sld>
 </file>
 
-<file path=ppt/slides/slide12.xml><?xml version="1.0" encoding="utf-8"?>
-<p:sld xmlns:a="http://schemas.openxmlformats.org/drawingml/2006/main" xmlns:r="http://schemas.openxmlformats.org/officeDocument/2006/relationships" xmlns:p="http://schemas.openxmlformats.org/presentationml/2006/main">
-  <p:cSld>
-    <p:spTree>
-      <p:nvGrpSpPr>
-        <p:cNvPr id="1" name=""/>
-        <p:cNvGrpSpPr/>
-        <p:nvPr/>
-      </p:nvGrpSpPr>
-      <p:grpSpPr>
-        <a:xfrm>
-          <a:off x="0" y="0"/>
-          <a:ext cx="0" cy="0"/>
-          <a:chOff x="0" y="0"/>
-          <a:chExt cx="0" cy="0"/>
-        </a:xfrm>
-      </p:grpSpPr>
-      <p:sp>
-        <p:nvSpPr>
-          <p:cNvPr id="2" name="Title 1">
-            <a:extLst>
-              <a:ext uri="{FF2B5EF4-FFF2-40B4-BE49-F238E27FC236}">
-                <a16:creationId xmlns:a16="http://schemas.microsoft.com/office/drawing/2014/main" id="{5F66CF5E-735E-277C-7A5D-E2A2BE6A744F}"/>
-              </a:ext>
-            </a:extLst>
-          </p:cNvPr>
-          <p:cNvSpPr>
-            <a:spLocks noGrp="1"/>
-          </p:cNvSpPr>
-          <p:nvPr>
-            <p:ph type="title"/>
-          </p:nvPr>
-        </p:nvSpPr>
-        <p:spPr/>
-        <p:txBody>
-          <a:bodyPr/>
-          <a:lstStyle/>
-          <a:p>
-            <a:r>
-              <a:rPr lang="ja-JP" altLang="en-US"/>
-              <a:t>ワークスペースにメンバーを招待する</a:t>
-            </a:r>
-          </a:p>
-        </p:txBody>
-      </p:sp>
-      <p:sp>
-        <p:nvSpPr>
-          <p:cNvPr id="3" name="Content Placeholder 2">
-            <a:extLst>
-              <a:ext uri="{FF2B5EF4-FFF2-40B4-BE49-F238E27FC236}">
-                <a16:creationId xmlns:a16="http://schemas.microsoft.com/office/drawing/2014/main" id="{2C4D2774-7CDA-8444-B067-0CF381F153DE}"/>
-              </a:ext>
-            </a:extLst>
-          </p:cNvPr>
-          <p:cNvSpPr>
-            <a:spLocks noGrp="1"/>
-          </p:cNvSpPr>
-          <p:nvPr>
-            <p:ph idx="1"/>
-          </p:nvPr>
-        </p:nvSpPr>
-        <p:spPr/>
-        <p:txBody>
-          <a:bodyPr vert="horz" lIns="91440" tIns="45720" rIns="91440" bIns="45720" rtlCol="0" anchor="t">
-            <a:normAutofit/>
-          </a:bodyPr>
-          <a:lstStyle/>
-          <a:p>
-            <a:r>
-              <a:rPr lang="en-US" altLang="ja-JP" dirty="0" err="1">
-                <a:ea typeface="メイリオ"/>
-              </a:rPr>
-              <a:t>UTokyo</a:t>
-            </a:r>
-            <a:r>
-              <a:rPr lang="en-US" altLang="ja-JP" dirty="0">
-                <a:ea typeface="メイリオ"/>
-              </a:rPr>
-              <a:t> Slack</a:t>
-            </a:r>
-            <a:r>
-              <a:rPr lang="ja-JP" altLang="en-US">
-                <a:ea typeface="メイリオ"/>
-              </a:rPr>
-              <a:t>でメンバーを招待する場合、</a:t>
-            </a:r>
-            <a:r>
-              <a:rPr lang="en-US" altLang="ja-JP" dirty="0">
-                <a:ea typeface="メイリオ"/>
-              </a:rPr>
-              <a:t> ID</a:t>
-            </a:r>
-            <a:r>
-              <a:rPr lang="ja-JP" altLang="en-US">
-                <a:ea typeface="メイリオ"/>
-              </a:rPr>
-              <a:t>には</a:t>
-            </a:r>
-            <a:br>
-              <a:rPr lang="en-US" altLang="ja-JP" dirty="0"/>
-            </a:br>
-            <a:r>
-              <a:rPr lang="ja-JP" altLang="en-US">
-                <a:ea typeface="メイリオ"/>
-              </a:rPr>
-              <a:t>「</a:t>
-            </a:r>
-            <a:r>
-              <a:rPr lang="en-US" altLang="ja-JP" dirty="0">
-                <a:ea typeface="メイリオ"/>
-              </a:rPr>
-              <a:t>10</a:t>
-            </a:r>
-            <a:r>
-              <a:rPr lang="ja-JP" altLang="en-US">
-                <a:ea typeface="メイリオ"/>
-              </a:rPr>
-              <a:t>桁の共通</a:t>
-            </a:r>
-            <a:r>
-              <a:rPr lang="en-US" altLang="ja-JP" dirty="0">
-                <a:ea typeface="メイリオ"/>
-              </a:rPr>
-              <a:t>ID@utac.u-tokyo.ac.jp</a:t>
-            </a:r>
-            <a:r>
-              <a:rPr lang="ja-JP" altLang="en-US">
-                <a:ea typeface="メイリオ"/>
-              </a:rPr>
-              <a:t>」を使います。</a:t>
-            </a:r>
-            <a:endParaRPr lang="en-US" altLang="ja-JP">
-              <a:ea typeface="メイリオ"/>
-            </a:endParaRPr>
-          </a:p>
-          <a:p>
-            <a:pPr lvl="1"/>
-            <a:r>
-              <a:rPr lang="ja-JP" altLang="en-US">
-                <a:ea typeface="メイリオ"/>
-              </a:rPr>
-              <a:t>他の</a:t>
-            </a:r>
-            <a:r>
-              <a:rPr lang="en-US" altLang="ja-JP" dirty="0">
-                <a:ea typeface="メイリオ"/>
-              </a:rPr>
-              <a:t>ID</a:t>
-            </a:r>
-            <a:r>
-              <a:rPr lang="ja-JP" altLang="en-US">
-                <a:ea typeface="メイリオ"/>
-              </a:rPr>
-              <a:t>で招待してもサインインできません。</a:t>
-            </a:r>
-            <a:endParaRPr lang="en-US" altLang="ja-JP">
-              <a:ea typeface="メイリオ"/>
-            </a:endParaRPr>
-          </a:p>
-          <a:p>
-            <a:r>
-              <a:rPr lang="ja-JP" altLang="en-US">
-                <a:ea typeface="メイリオ"/>
-              </a:rPr>
-              <a:t>授業の場合、</a:t>
-            </a:r>
-            <a:r>
-              <a:rPr lang="ja-JP" altLang="en-US" b="1">
-                <a:ea typeface="メイリオ"/>
-              </a:rPr>
-              <a:t>UTASや</a:t>
-            </a:r>
-            <a:r>
-              <a:rPr lang="en-US" altLang="ja-JP" b="1" dirty="0">
-                <a:ea typeface="メイリオ"/>
-              </a:rPr>
-              <a:t>ITC-LMS</a:t>
-            </a:r>
-            <a:r>
-              <a:rPr lang="ja-JP" altLang="en-US" b="1">
-                <a:ea typeface="メイリオ"/>
-              </a:rPr>
-              <a:t>の名簿で一覧が取得可能</a:t>
-            </a:r>
-            <a:r>
-              <a:rPr lang="ja-JP" altLang="en-US">
-                <a:ea typeface="メイリオ"/>
-              </a:rPr>
-              <a:t>です。</a:t>
-            </a:r>
-            <a:endParaRPr lang="en-US" altLang="ja-JP">
-              <a:ea typeface="メイリオ"/>
-            </a:endParaRPr>
-          </a:p>
-          <a:p>
-            <a:pPr lvl="1"/>
-            <a:r>
-              <a:rPr lang="ja-JP" altLang="en-US"/>
-              <a:t>履修登録終了前は登録を済ませた人だけが載っていることに注意</a:t>
-            </a:r>
-            <a:endParaRPr lang="en-US" altLang="ja-JP"/>
-          </a:p>
-          <a:p>
-            <a:r>
-              <a:rPr lang="ja-JP" altLang="en-US"/>
-              <a:t>改行区切りで貼り付けると複数人まとめて招待できます。</a:t>
-            </a:r>
-            <a:endParaRPr lang="en-US" altLang="ja-JP"/>
-          </a:p>
-          <a:p>
-            <a:pPr lvl="1"/>
-            <a:r>
-              <a:rPr lang="en-US" altLang="ja-JP" dirty="0">
-                <a:ea typeface="メイリオ"/>
-              </a:rPr>
-              <a:t>Excel</a:t>
-            </a:r>
-            <a:r>
-              <a:rPr lang="ja-JP" altLang="en-US">
-                <a:ea typeface="メイリオ"/>
-              </a:rPr>
-              <a:t>で「</a:t>
-            </a:r>
-            <a:r>
-              <a:rPr lang="en-US" altLang="ja-JP" dirty="0">
-                <a:ea typeface="メイリオ"/>
-              </a:rPr>
-              <a:t>10</a:t>
-            </a:r>
-            <a:r>
-              <a:rPr lang="ja-JP" altLang="en-US">
-                <a:ea typeface="メイリオ"/>
-              </a:rPr>
-              <a:t>桁の共通</a:t>
-            </a:r>
-            <a:r>
-              <a:rPr lang="en-US" altLang="ja-JP" dirty="0">
-                <a:ea typeface="メイリオ"/>
-              </a:rPr>
-              <a:t>ID@utac.u-tokyo.ac.jp</a:t>
-            </a:r>
-            <a:r>
-              <a:rPr lang="ja-JP" altLang="en-US">
-                <a:ea typeface="メイリオ"/>
-              </a:rPr>
-              <a:t>」の形式に加工して貼り付けると簡単です。</a:t>
-            </a:r>
-            <a:endParaRPr lang="en-US" altLang="ja-JP">
-              <a:ea typeface="メイリオ"/>
-            </a:endParaRPr>
-          </a:p>
-          <a:p>
-            <a:pPr marL="57150" indent="0">
-              <a:buNone/>
-            </a:pPr>
-            <a:r>
-              <a:rPr lang="ja-JP" altLang="en-US">
-                <a:ea typeface="メイリオ"/>
-              </a:rPr>
-              <a:t>詳細→</a:t>
-            </a:r>
-            <a:r>
-              <a:rPr lang="ja-JP" altLang="en-US" dirty="0">
-                <a:ea typeface="メイリオ"/>
-                <a:hlinkClick r:id="rId2"/>
-              </a:rPr>
-              <a:t>メンバーの招待</a:t>
-            </a:r>
-            <a:endParaRPr lang="en-US" altLang="ja-JP" dirty="0">
-              <a:ea typeface="メイリオ"/>
-            </a:endParaRPr>
-          </a:p>
-        </p:txBody>
-      </p:sp>
-      <p:sp>
-        <p:nvSpPr>
-          <p:cNvPr id="4" name="Slide Number Placeholder 3">
-            <a:extLst>
-              <a:ext uri="{FF2B5EF4-FFF2-40B4-BE49-F238E27FC236}">
-                <a16:creationId xmlns:a16="http://schemas.microsoft.com/office/drawing/2014/main" id="{45B2B187-903F-A39D-8D11-12A940036F49}"/>
-              </a:ext>
-            </a:extLst>
-          </p:cNvPr>
-          <p:cNvSpPr>
-            <a:spLocks noGrp="1"/>
-          </p:cNvSpPr>
-          <p:nvPr>
-            <p:ph type="sldNum" sz="quarter" idx="12"/>
-          </p:nvPr>
-        </p:nvSpPr>
-        <p:spPr/>
-        <p:txBody>
-          <a:bodyPr/>
-          <a:lstStyle/>
-          <a:p>
-            <a:fld id="{7132C4A5-202B-4DA4-9DB0-0994E867E2A1}" type="slidenum">
-              <a:rPr lang="ja-JP" altLang="en-US" smtClean="0"/>
-              <a:pPr/>
-              <a:t>12</a:t>
-            </a:fld>
-            <a:endParaRPr lang="ja-JP" altLang="en-US"/>
-          </a:p>
-        </p:txBody>
-      </p:sp>
-    </p:spTree>
-    <p:extLst>
-      <p:ext uri="{BB962C8B-B14F-4D97-AF65-F5344CB8AC3E}">
-        <p14:creationId xmlns:p14="http://schemas.microsoft.com/office/powerpoint/2010/main" val="214988987"/>
-      </p:ext>
-    </p:extLst>
-  </p:cSld>
-  <p:clrMapOvr>
-    <a:masterClrMapping/>
-  </p:clrMapOvr>
-</p:sld>
-</file>
-
 <file path=ppt/slides/slide13.xml><?xml version="1.0" encoding="utf-8"?>
 <p:sld xmlns:a="http://schemas.openxmlformats.org/drawingml/2006/main" xmlns:r="http://schemas.openxmlformats.org/officeDocument/2006/relationships" xmlns:p="http://schemas.openxmlformats.org/presentationml/2006/main">
   <p:cSld>
@@ -7178,10 +7063,10 @@
       </p:grpSpPr>
       <p:sp>
         <p:nvSpPr>
-          <p:cNvPr id="2" name="タイトル 1">
+          <p:cNvPr id="2" name="Title 1">
             <a:extLst>
               <a:ext uri="{FF2B5EF4-FFF2-40B4-BE49-F238E27FC236}">
-                <a16:creationId xmlns:a16="http://schemas.microsoft.com/office/drawing/2014/main" id="{E9ADF16B-DF6D-A210-0AD9-64B4A03B653D}"/>
+                <a16:creationId xmlns:a16="http://schemas.microsoft.com/office/drawing/2014/main" id="{5F66CF5E-735E-277C-7A5D-E2A2BE6A744F}"/>
               </a:ext>
             </a:extLst>
           </p:cNvPr>
@@ -7199,17 +7084,17 @@
           <a:p>
             <a:r>
               <a:rPr lang="ja-JP" altLang="en-US"/>
-              <a:t>ワークスペースの一覧画面</a:t>
-            </a:r>
-          </a:p>
-        </p:txBody>
-      </p:sp>
-      <p:sp>
-        <p:nvSpPr>
-          <p:cNvPr id="3" name="コンテンツ プレースホルダー 2">
+              <a:t>ワークスペースにメンバーを招待する</a:t>
+            </a:r>
+          </a:p>
+        </p:txBody>
+      </p:sp>
+      <p:sp>
+        <p:nvSpPr>
+          <p:cNvPr id="3" name="Content Placeholder 2">
             <a:extLst>
               <a:ext uri="{FF2B5EF4-FFF2-40B4-BE49-F238E27FC236}">
-                <a16:creationId xmlns:a16="http://schemas.microsoft.com/office/drawing/2014/main" id="{65D5DEE5-AD59-8AE3-E591-5C66B90A1D52}"/>
+                <a16:creationId xmlns:a16="http://schemas.microsoft.com/office/drawing/2014/main" id="{2C4D2774-7CDA-8444-B067-0CF381F153DE}"/>
               </a:ext>
             </a:extLst>
           </p:cNvPr>
@@ -7222,56 +7107,223 @@
         </p:nvSpPr>
         <p:spPr/>
         <p:txBody>
-          <a:bodyPr/>
+          <a:bodyPr vert="horz" lIns="91440" tIns="45720" rIns="91440" bIns="45720" rtlCol="0" anchor="t">
+            <a:normAutofit/>
+          </a:bodyPr>
           <a:lstStyle/>
           <a:p>
-            <a:pPr marL="0" indent="0">
+            <a:r>
+              <a:rPr lang="en-US" altLang="ja-JP" err="1">
+                <a:ea typeface="メイリオ"/>
+              </a:rPr>
+              <a:t>UTokyo</a:t>
+            </a:r>
+            <a:r>
+              <a:rPr lang="en-US" altLang="ja-JP">
+                <a:ea typeface="メイリオ"/>
+              </a:rPr>
+              <a:t> Slack</a:t>
+            </a:r>
+            <a:r>
+              <a:rPr lang="ja-JP" altLang="en-US">
+                <a:ea typeface="メイリオ"/>
+              </a:rPr>
+              <a:t>でメンバーを招待する場合、</a:t>
+            </a:r>
+            <a:r>
+              <a:rPr lang="en-US" altLang="ja-JP">
+                <a:ea typeface="メイリオ"/>
+              </a:rPr>
+              <a:t> ID</a:t>
+            </a:r>
+            <a:r>
+              <a:rPr lang="ja-JP" altLang="en-US">
+                <a:ea typeface="メイリオ"/>
+              </a:rPr>
+              <a:t>には</a:t>
+            </a:r>
+            <a:br>
+              <a:rPr lang="en-US" altLang="ja-JP"/>
+            </a:br>
+            <a:r>
+              <a:rPr lang="ja-JP" altLang="en-US">
+                <a:ea typeface="メイリオ"/>
+              </a:rPr>
+              <a:t>「</a:t>
+            </a:r>
+            <a:r>
+              <a:rPr lang="en-US" altLang="ja-JP">
+                <a:ea typeface="メイリオ"/>
+              </a:rPr>
+              <a:t>10</a:t>
+            </a:r>
+            <a:r>
+              <a:rPr lang="ja-JP" altLang="en-US">
+                <a:ea typeface="メイリオ"/>
+              </a:rPr>
+              <a:t>桁の共通</a:t>
+            </a:r>
+            <a:r>
+              <a:rPr lang="en-US" altLang="ja-JP">
+                <a:ea typeface="メイリオ"/>
+              </a:rPr>
+              <a:t>ID@utac.u-tokyo.ac.jp</a:t>
+            </a:r>
+            <a:r>
+              <a:rPr lang="ja-JP" altLang="en-US">
+                <a:ea typeface="メイリオ"/>
+              </a:rPr>
+              <a:t>」を使います。</a:t>
+            </a:r>
+            <a:endParaRPr lang="en-US" altLang="ja-JP">
+              <a:ea typeface="メイリオ"/>
+            </a:endParaRPr>
+          </a:p>
+          <a:p>
+            <a:pPr lvl="1"/>
+            <a:r>
+              <a:rPr lang="ja-JP" altLang="en-US">
+                <a:ea typeface="メイリオ"/>
+              </a:rPr>
+              <a:t>他の</a:t>
+            </a:r>
+            <a:r>
+              <a:rPr lang="en-US" altLang="ja-JP">
+                <a:ea typeface="メイリオ"/>
+              </a:rPr>
+              <a:t>ID</a:t>
+            </a:r>
+            <a:r>
+              <a:rPr lang="ja-JP" altLang="en-US">
+                <a:ea typeface="メイリオ"/>
+              </a:rPr>
+              <a:t>で招待してもサインインできません。</a:t>
+            </a:r>
+            <a:endParaRPr lang="en-US" altLang="ja-JP">
+              <a:ea typeface="メイリオ"/>
+            </a:endParaRPr>
+          </a:p>
+          <a:p>
+            <a:r>
+              <a:rPr lang="ja-JP" altLang="en-US">
+                <a:ea typeface="メイリオ"/>
+              </a:rPr>
+              <a:t>授業の場合、</a:t>
+            </a:r>
+            <a:r>
+              <a:rPr lang="ja-JP" altLang="en-US" b="1">
+                <a:ea typeface="メイリオ"/>
+              </a:rPr>
+              <a:t>UTASや</a:t>
+            </a:r>
+            <a:r>
+              <a:rPr lang="en-US" altLang="ja-JP" b="1">
+                <a:ea typeface="メイリオ"/>
+              </a:rPr>
+              <a:t>ITC-LMS</a:t>
+            </a:r>
+            <a:r>
+              <a:rPr lang="ja-JP" altLang="en-US" b="1">
+                <a:ea typeface="メイリオ"/>
+              </a:rPr>
+              <a:t>の名簿で一覧が取得可能</a:t>
+            </a:r>
+            <a:r>
+              <a:rPr lang="ja-JP" altLang="en-US">
+                <a:ea typeface="メイリオ"/>
+              </a:rPr>
+              <a:t>です。</a:t>
+            </a:r>
+            <a:endParaRPr lang="en-US" altLang="ja-JP">
+              <a:ea typeface="メイリオ"/>
+            </a:endParaRPr>
+          </a:p>
+          <a:p>
+            <a:pPr lvl="1"/>
+            <a:r>
+              <a:rPr lang="ja-JP" altLang="en-US"/>
+              <a:t>履修登録終了前は登録を済ませた人だけが載っていることに注意</a:t>
+            </a:r>
+            <a:endParaRPr lang="en-US" altLang="ja-JP"/>
+          </a:p>
+          <a:p>
+            <a:r>
+              <a:rPr lang="ja-JP" altLang="en-US"/>
+              <a:t>改行区切りで貼り付けると複数人まとめて招待できます。</a:t>
+            </a:r>
+            <a:endParaRPr lang="en-US" altLang="ja-JP"/>
+          </a:p>
+          <a:p>
+            <a:pPr lvl="1"/>
+            <a:r>
+              <a:rPr lang="en-US" altLang="ja-JP">
+                <a:ea typeface="メイリオ"/>
+              </a:rPr>
+              <a:t>Excel</a:t>
+            </a:r>
+            <a:r>
+              <a:rPr lang="ja-JP" altLang="en-US">
+                <a:ea typeface="メイリオ"/>
+              </a:rPr>
+              <a:t>で「</a:t>
+            </a:r>
+            <a:r>
+              <a:rPr lang="en-US" altLang="ja-JP">
+                <a:ea typeface="メイリオ"/>
+              </a:rPr>
+              <a:t>10</a:t>
+            </a:r>
+            <a:r>
+              <a:rPr lang="ja-JP" altLang="en-US">
+                <a:ea typeface="メイリオ"/>
+              </a:rPr>
+              <a:t>桁の共通</a:t>
+            </a:r>
+            <a:r>
+              <a:rPr lang="en-US" altLang="ja-JP">
+                <a:ea typeface="メイリオ"/>
+              </a:rPr>
+              <a:t>ID@utac.u-tokyo.ac.jp</a:t>
+            </a:r>
+            <a:r>
+              <a:rPr lang="ja-JP" altLang="en-US">
+                <a:ea typeface="メイリオ"/>
+              </a:rPr>
+              <a:t>」の形式に加工して貼り付けると簡単です。</a:t>
+            </a:r>
+            <a:endParaRPr lang="en-US" altLang="ja-JP">
+              <a:ea typeface="メイリオ"/>
+            </a:endParaRPr>
+          </a:p>
+          <a:p>
+            <a:pPr marL="57150" indent="0">
               <a:buNone/>
             </a:pPr>
             <a:r>
-              <a:rPr lang="en-US" altLang="ja-JP" err="1"/>
-              <a:t>UTokyo</a:t>
-            </a:r>
-            <a:r>
-              <a:rPr lang="en-US" altLang="ja-JP"/>
-              <a:t> Slack</a:t>
-            </a:r>
-            <a:r>
-              <a:rPr lang="ja-JP" altLang="en-US"/>
-              <a:t>特有の機能として、ワークスペースの一覧画面があります。</a:t>
-            </a:r>
-            <a:endParaRPr lang="en-US" altLang="ja-JP"/>
-          </a:p>
-          <a:p>
-            <a:r>
-              <a:rPr lang="ja-JP" altLang="en-US"/>
-              <a:t>自動的に掲載されるわけではなく、手動で「公開範囲」の設定を変更すると掲載されるようになります。</a:t>
-            </a:r>
-            <a:endParaRPr lang="en-US" altLang="ja-JP"/>
-          </a:p>
-          <a:p>
-            <a:r>
-              <a:rPr lang="ja-JP" altLang="en-US"/>
-              <a:t>一覧画面からワークスペースへの参加を受け付ける設定も可能です。</a:t>
-            </a:r>
-            <a:endParaRPr lang="en-US" altLang="ja-JP"/>
-          </a:p>
-          <a:p>
-            <a:pPr lvl="1"/>
-            <a:r>
-              <a:rPr lang="ja-JP" altLang="en-US"/>
-              <a:t>東京大学の構成員に広く参加してもらえるようなオープンな場を作ることができます。</a:t>
-            </a:r>
-            <a:endParaRPr lang="en-US" altLang="ja-JP"/>
-          </a:p>
-        </p:txBody>
-      </p:sp>
-      <p:sp>
-        <p:nvSpPr>
-          <p:cNvPr id="4" name="スライド番号プレースホルダー 3">
+              <a:rPr lang="ja-JP" altLang="en-US">
+                <a:ea typeface="メイリオ"/>
+              </a:rPr>
+              <a:t>詳細→</a:t>
+            </a:r>
+            <a:r>
+              <a:rPr lang="ja-JP" altLang="en-US">
+                <a:ea typeface="メイリオ"/>
+                <a:hlinkClick r:id="rId2"/>
+              </a:rPr>
+              <a:t>メンバーの招待</a:t>
+            </a:r>
+            <a:endParaRPr lang="en-US" altLang="ja-JP">
+              <a:ea typeface="メイリオ"/>
+            </a:endParaRPr>
+          </a:p>
+        </p:txBody>
+      </p:sp>
+      <p:sp>
+        <p:nvSpPr>
+          <p:cNvPr id="4" name="Slide Number Placeholder 3">
             <a:extLst>
               <a:ext uri="{FF2B5EF4-FFF2-40B4-BE49-F238E27FC236}">
-                <a16:creationId xmlns:a16="http://schemas.microsoft.com/office/drawing/2014/main" id="{AD858E0F-06EC-8EA2-D3EB-EBDA3172B638}"/>
+                <a16:creationId xmlns:a16="http://schemas.microsoft.com/office/drawing/2014/main" id="{45B2B187-903F-A39D-8D11-12A940036F49}"/>
               </a:ext>
             </a:extLst>
           </p:cNvPr>
@@ -7299,7 +7351,7 @@
     </p:spTree>
     <p:extLst>
       <p:ext uri="{BB962C8B-B14F-4D97-AF65-F5344CB8AC3E}">
-        <p14:creationId xmlns:p14="http://schemas.microsoft.com/office/powerpoint/2010/main" val="3890446347"/>
+        <p14:creationId xmlns:p14="http://schemas.microsoft.com/office/powerpoint/2010/main" val="214988987"/>
       </p:ext>
     </p:extLst>
   </p:cSld>
@@ -7328,10 +7380,10 @@
       </p:grpSpPr>
       <p:sp>
         <p:nvSpPr>
-          <p:cNvPr id="2" name="Title 1">
+          <p:cNvPr id="2" name="タイトル 1">
             <a:extLst>
               <a:ext uri="{FF2B5EF4-FFF2-40B4-BE49-F238E27FC236}">
-                <a16:creationId xmlns:a16="http://schemas.microsoft.com/office/drawing/2014/main" id="{2F5FF2B2-E8C2-16E1-A050-C49C493558CA}"/>
+                <a16:creationId xmlns:a16="http://schemas.microsoft.com/office/drawing/2014/main" id="{E9ADF16B-DF6D-A210-0AD9-64B4A03B653D}"/>
               </a:ext>
             </a:extLst>
           </p:cNvPr>
@@ -7349,18 +7401,17 @@
           <a:p>
             <a:r>
               <a:rPr lang="ja-JP" altLang="en-US"/>
-              <a:t>学外者と一緒に利用する</a:t>
-            </a:r>
-            <a:endParaRPr lang="en-US"/>
-          </a:p>
-        </p:txBody>
-      </p:sp>
-      <p:sp>
-        <p:nvSpPr>
-          <p:cNvPr id="3" name="Content Placeholder 2">
+              <a:t>ワークスペースの一覧画面</a:t>
+            </a:r>
+          </a:p>
+        </p:txBody>
+      </p:sp>
+      <p:sp>
+        <p:nvSpPr>
+          <p:cNvPr id="3" name="コンテンツ プレースホルダー 2">
             <a:extLst>
               <a:ext uri="{FF2B5EF4-FFF2-40B4-BE49-F238E27FC236}">
-                <a16:creationId xmlns:a16="http://schemas.microsoft.com/office/drawing/2014/main" id="{1EBB3F3D-DC02-14C8-A84E-8E9168C2761C}"/>
+                <a16:creationId xmlns:a16="http://schemas.microsoft.com/office/drawing/2014/main" id="{65D5DEE5-AD59-8AE3-E591-5C66B90A1D52}"/>
               </a:ext>
             </a:extLst>
           </p:cNvPr>
@@ -7373,157 +7424,64 @@
         </p:nvSpPr>
         <p:spPr/>
         <p:txBody>
-          <a:bodyPr vert="horz" lIns="91440" tIns="45720" rIns="91440" bIns="45720" rtlCol="0" anchor="t">
-            <a:normAutofit/>
-          </a:bodyPr>
+          <a:bodyPr/>
           <a:lstStyle/>
           <a:p>
+            <a:pPr marL="0" indent="0">
+              <a:buNone/>
+            </a:pPr>
+            <a:r>
+              <a:rPr lang="en-US" altLang="ja-JP" err="1"/>
+              <a:t>UTokyo</a:t>
+            </a:r>
+            <a:r>
+              <a:rPr lang="en-US" altLang="ja-JP"/>
+              <a:t> Slack</a:t>
+            </a:r>
+            <a:r>
+              <a:rPr lang="ja-JP" altLang="en-US"/>
+              <a:t>特有の機能として、ワークスペースの一覧画面があります。</a:t>
+            </a:r>
+            <a:endParaRPr lang="en-US" altLang="ja-JP"/>
+          </a:p>
+          <a:p>
+            <a:r>
+              <a:rPr lang="ja-JP" altLang="en-US"/>
+              <a:t>自動的に掲載されるわけではなく、手動で「公開範囲」の設定を変更すると掲載されるようになります。</a:t>
+            </a:r>
+            <a:endParaRPr lang="en-US" altLang="ja-JP"/>
+          </a:p>
+          <a:p>
+            <a:r>
+              <a:rPr lang="ja-JP" altLang="en-US"/>
+              <a:t>一覧画面からワークスペースへの参加を受け付ける設定も可能です。</a:t>
+            </a:r>
+            <a:endParaRPr lang="en-US" altLang="ja-JP"/>
+          </a:p>
+          <a:p>
+            <a:pPr lvl="1"/>
+            <a:r>
+              <a:rPr lang="ja-JP" altLang="en-US" b="1"/>
+              <a:t>東京大学の構成員に広く参加してもらえるようなオープンな場</a:t>
+            </a:r>
+            <a:r>
+              <a:rPr lang="ja-JP" altLang="en-US"/>
+              <a:t>を作ることができます。</a:t>
+            </a:r>
+            <a:endParaRPr lang="en-US" altLang="ja-JP"/>
+          </a:p>
+          <a:p>
+            <a:r>
+              <a:rPr lang="ja-JP" altLang="en-US"/>
+              <a:t>詳細→</a:t>
+            </a:r>
             <a:r>
               <a:rPr lang="ja-JP" altLang="en-US">
-                <a:ea typeface="メイリオ"/>
-              </a:rPr>
-              <a:t>利用対象者は基本的には</a:t>
-            </a:r>
-            <a:r>
-              <a:rPr lang="en-US" altLang="ja-JP" dirty="0" err="1">
-                <a:ea typeface="メイリオ"/>
-              </a:rPr>
-              <a:t>UTokyo</a:t>
-            </a:r>
-            <a:r>
-              <a:rPr lang="en-US" altLang="ja-JP" dirty="0">
-                <a:ea typeface="メイリオ"/>
-              </a:rPr>
-              <a:t> Account</a:t>
-            </a:r>
-            <a:r>
-              <a:rPr lang="ja-JP" altLang="en-US">
-                <a:ea typeface="メイリオ"/>
-              </a:rPr>
-              <a:t>を持つ構成員ですが、</a:t>
-            </a:r>
-            <a:r>
-              <a:rPr lang="ja-JP" altLang="en-US" b="1">
-                <a:ea typeface="メイリオ"/>
-              </a:rPr>
-              <a:t>「コネクト」機能</a:t>
-            </a:r>
-            <a:r>
-              <a:rPr lang="ja-JP" altLang="en-US">
-                <a:ea typeface="メイリオ"/>
-              </a:rPr>
-              <a:t>で学外者と一緒に利用する方法があります。</a:t>
-            </a:r>
-            <a:endParaRPr lang="en-US" altLang="ja-JP">
-              <a:ea typeface="メイリオ"/>
-            </a:endParaRPr>
-          </a:p>
-          <a:p>
-            <a:pPr lvl="1"/>
-            <a:r>
-              <a:rPr lang="ja-JP" altLang="en-US"/>
-              <a:t>ただし、通常のワークスペースと使い勝手が同様ではなく、常におすすめできるわけではありません。</a:t>
+                <a:hlinkClick r:id="rId2"/>
+              </a:rPr>
+              <a:t>ワークスペースの公開範囲</a:t>
             </a:r>
             <a:endParaRPr lang="en-US" altLang="ja-JP"/>
-          </a:p>
-          <a:p>
-            <a:r>
-              <a:rPr lang="ja-JP" altLang="en-US"/>
-              <a:t>「コネクト」機能は、複数のワークスペースでチャンネルを共有（相互乗り入れ）する機能です。</a:t>
-            </a:r>
-            <a:endParaRPr lang="en-US" altLang="ja-JP"/>
-          </a:p>
-          <a:p>
-            <a:pPr lvl="1"/>
-            <a:r>
-              <a:rPr lang="ja-JP" altLang="en-US">
-                <a:ea typeface="メイリオ"/>
-              </a:rPr>
-              <a:t>学外者は、直接</a:t>
-            </a:r>
-            <a:r>
-              <a:rPr lang="en-US" altLang="ja-JP" dirty="0" err="1">
-                <a:ea typeface="メイリオ"/>
-              </a:rPr>
-              <a:t>UTokyo</a:t>
-            </a:r>
-            <a:r>
-              <a:rPr lang="en-US" altLang="ja-JP" dirty="0">
-                <a:ea typeface="メイリオ"/>
-              </a:rPr>
-              <a:t> Slack</a:t>
-            </a:r>
-            <a:r>
-              <a:rPr lang="ja-JP" altLang="en-US">
-                <a:ea typeface="メイリオ"/>
-              </a:rPr>
-              <a:t>のワークスペースに参加するのではなく、外部の別のワークスペースに参加して利用することになります。</a:t>
-            </a:r>
-            <a:endParaRPr lang="en-US" altLang="ja-JP">
-              <a:ea typeface="メイリオ"/>
-            </a:endParaRPr>
-          </a:p>
-          <a:p>
-            <a:pPr lvl="1"/>
-            <a:r>
-              <a:rPr lang="ja-JP" altLang="en-US">
-                <a:ea typeface="メイリオ"/>
-              </a:rPr>
-              <a:t>通常は有償ワークスペース同士でしか利用できない機能ですが、</a:t>
-            </a:r>
-            <a:r>
-              <a:rPr lang="en-US" altLang="ja-JP" dirty="0" err="1">
-                <a:ea typeface="メイリオ"/>
-              </a:rPr>
-              <a:t>UTokyo</a:t>
-            </a:r>
-            <a:r>
-              <a:rPr lang="en-US" altLang="ja-JP" dirty="0">
-                <a:ea typeface="メイリオ"/>
-              </a:rPr>
-              <a:t> Slack</a:t>
-            </a:r>
-            <a:r>
-              <a:rPr lang="ja-JP" altLang="en-US">
-                <a:ea typeface="メイリオ"/>
-              </a:rPr>
-              <a:t>のプランでは、相手のワークスペースが無償利用のワークスペースでも利用できます。</a:t>
-            </a:r>
-            <a:endParaRPr lang="en-US" altLang="ja-JP">
-              <a:ea typeface="メイリオ"/>
-            </a:endParaRPr>
-          </a:p>
-          <a:p>
-            <a:r>
-              <a:rPr lang="ja-JP" altLang="en-US">
-                <a:ea typeface="メイリオ"/>
-              </a:rPr>
-              <a:t>詳細→</a:t>
-            </a:r>
-            <a:r>
-              <a:rPr lang="ja-JP" altLang="en-US" dirty="0">
-                <a:ea typeface="メイリオ"/>
-                <a:hlinkClick r:id="rId2"/>
-              </a:rPr>
-              <a:t>「コネクト」機能を用いて学外者と一緒に</a:t>
-            </a:r>
-            <a:r>
-              <a:rPr lang="en-US" altLang="ja-JP" dirty="0">
-                <a:ea typeface="メイリオ"/>
-                <a:hlinkClick r:id="rId2"/>
-              </a:rPr>
-              <a:t>UTokyo Slack</a:t>
-            </a:r>
-            <a:r>
-              <a:rPr lang="ja-JP" altLang="en-US" dirty="0">
-                <a:ea typeface="メイリオ"/>
-                <a:hlinkClick r:id="rId2"/>
-              </a:rPr>
-              <a:t>を利用する</a:t>
-            </a:r>
-            <a:endParaRPr lang="en-US" altLang="ja-JP" dirty="0">
-              <a:ea typeface="メイリオ"/>
-            </a:endParaRPr>
           </a:p>
         </p:txBody>
       </p:sp>
@@ -7532,7 +7490,7 @@
           <p:cNvPr id="4" name="スライド番号プレースホルダー 3">
             <a:extLst>
               <a:ext uri="{FF2B5EF4-FFF2-40B4-BE49-F238E27FC236}">
-                <a16:creationId xmlns:a16="http://schemas.microsoft.com/office/drawing/2014/main" id="{289963F3-043E-4C99-B9AB-9C5B58340139}"/>
+                <a16:creationId xmlns:a16="http://schemas.microsoft.com/office/drawing/2014/main" id="{AD858E0F-06EC-8EA2-D3EB-EBDA3172B638}"/>
               </a:ext>
             </a:extLst>
           </p:cNvPr>
@@ -7560,7 +7518,7 @@
     </p:spTree>
     <p:extLst>
       <p:ext uri="{BB962C8B-B14F-4D97-AF65-F5344CB8AC3E}">
-        <p14:creationId xmlns:p14="http://schemas.microsoft.com/office/powerpoint/2010/main" val="2566095105"/>
+        <p14:creationId xmlns:p14="http://schemas.microsoft.com/office/powerpoint/2010/main" val="3890446347"/>
       </p:ext>
     </p:extLst>
   </p:cSld>
@@ -7589,10 +7547,10 @@
       </p:grpSpPr>
       <p:sp>
         <p:nvSpPr>
-          <p:cNvPr id="4" name="タイトル 3">
+          <p:cNvPr id="2" name="Title 1">
             <a:extLst>
               <a:ext uri="{FF2B5EF4-FFF2-40B4-BE49-F238E27FC236}">
-                <a16:creationId xmlns:a16="http://schemas.microsoft.com/office/drawing/2014/main" id="{955B51E1-3E5D-C904-2EBE-3D1F59FE7FA3}"/>
+                <a16:creationId xmlns:a16="http://schemas.microsoft.com/office/drawing/2014/main" id="{2F5FF2B2-E8C2-16E1-A050-C49C493558CA}"/>
               </a:ext>
             </a:extLst>
           </p:cNvPr>
@@ -7610,17 +7568,18 @@
           <a:p>
             <a:r>
               <a:rPr lang="ja-JP" altLang="en-US"/>
-              <a:t>既存ワークスペースの対応</a:t>
-            </a:r>
-          </a:p>
-        </p:txBody>
-      </p:sp>
-      <p:sp>
-        <p:nvSpPr>
-          <p:cNvPr id="5" name="テキスト プレースホルダー 4">
+              <a:t>学外者と一緒に利用する</a:t>
+            </a:r>
+            <a:endParaRPr lang="en-US"/>
+          </a:p>
+        </p:txBody>
+      </p:sp>
+      <p:sp>
+        <p:nvSpPr>
+          <p:cNvPr id="3" name="Content Placeholder 2">
             <a:extLst>
               <a:ext uri="{FF2B5EF4-FFF2-40B4-BE49-F238E27FC236}">
-                <a16:creationId xmlns:a16="http://schemas.microsoft.com/office/drawing/2014/main" id="{FA1A5C3A-6126-433A-B4C2-FDD2900CA5D6}"/>
+                <a16:creationId xmlns:a16="http://schemas.microsoft.com/office/drawing/2014/main" id="{1EBB3F3D-DC02-14C8-A84E-8E9168C2761C}"/>
               </a:ext>
             </a:extLst>
           </p:cNvPr>
@@ -7628,7 +7587,179 @@
             <a:spLocks noGrp="1"/>
           </p:cNvSpPr>
           <p:nvPr>
-            <p:ph type="body" idx="1"/>
+            <p:ph idx="1"/>
+          </p:nvPr>
+        </p:nvSpPr>
+        <p:spPr/>
+        <p:txBody>
+          <a:bodyPr vert="horz" lIns="91440" tIns="45720" rIns="91440" bIns="45720" rtlCol="0" anchor="t">
+            <a:normAutofit/>
+          </a:bodyPr>
+          <a:lstStyle/>
+          <a:p>
+            <a:r>
+              <a:rPr lang="ja-JP" altLang="en-US">
+                <a:ea typeface="メイリオ"/>
+              </a:rPr>
+              <a:t>利用対象者は基本的には</a:t>
+            </a:r>
+            <a:r>
+              <a:rPr lang="en-US" altLang="ja-JP" err="1">
+                <a:ea typeface="メイリオ"/>
+              </a:rPr>
+              <a:t>UTokyo</a:t>
+            </a:r>
+            <a:r>
+              <a:rPr lang="en-US" altLang="ja-JP">
+                <a:ea typeface="メイリオ"/>
+              </a:rPr>
+              <a:t> Account</a:t>
+            </a:r>
+            <a:r>
+              <a:rPr lang="ja-JP" altLang="en-US">
+                <a:ea typeface="メイリオ"/>
+              </a:rPr>
+              <a:t>を持つ構成員ですが、</a:t>
+            </a:r>
+            <a:r>
+              <a:rPr lang="ja-JP" altLang="en-US" b="1">
+                <a:ea typeface="メイリオ"/>
+              </a:rPr>
+              <a:t>「コネクト」機能</a:t>
+            </a:r>
+            <a:r>
+              <a:rPr lang="ja-JP" altLang="en-US">
+                <a:ea typeface="メイリオ"/>
+              </a:rPr>
+              <a:t>で学外者と一緒に利用する方法があります。</a:t>
+            </a:r>
+            <a:endParaRPr lang="en-US" altLang="ja-JP">
+              <a:ea typeface="メイリオ"/>
+            </a:endParaRPr>
+          </a:p>
+          <a:p>
+            <a:pPr lvl="1"/>
+            <a:r>
+              <a:rPr lang="ja-JP" altLang="en-US"/>
+              <a:t>ただし、通常のワークスペースと使い勝手が同様ではなく、常におすすめできるわけではありません。</a:t>
+            </a:r>
+            <a:endParaRPr lang="en-US" altLang="ja-JP"/>
+          </a:p>
+          <a:p>
+            <a:r>
+              <a:rPr lang="ja-JP" altLang="en-US"/>
+              <a:t>「コネクト」機能は、複数のワークスペースでチャンネルを共有（相互乗り入れ）する機能です。</a:t>
+            </a:r>
+            <a:endParaRPr lang="en-US" altLang="ja-JP"/>
+          </a:p>
+          <a:p>
+            <a:pPr lvl="1"/>
+            <a:r>
+              <a:rPr lang="ja-JP" altLang="en-US">
+                <a:ea typeface="メイリオ"/>
+              </a:rPr>
+              <a:t>学外者は、直接</a:t>
+            </a:r>
+            <a:r>
+              <a:rPr lang="en-US" altLang="ja-JP" err="1">
+                <a:ea typeface="メイリオ"/>
+              </a:rPr>
+              <a:t>UTokyo</a:t>
+            </a:r>
+            <a:r>
+              <a:rPr lang="en-US" altLang="ja-JP">
+                <a:ea typeface="メイリオ"/>
+              </a:rPr>
+              <a:t> Slack</a:t>
+            </a:r>
+            <a:r>
+              <a:rPr lang="ja-JP" altLang="en-US">
+                <a:ea typeface="メイリオ"/>
+              </a:rPr>
+              <a:t>のワークスペースに参加するのではなく、外部の別のワークスペースに参加して利用することになります。</a:t>
+            </a:r>
+            <a:endParaRPr lang="en-US" altLang="ja-JP">
+              <a:ea typeface="メイリオ"/>
+            </a:endParaRPr>
+          </a:p>
+          <a:p>
+            <a:pPr lvl="1"/>
+            <a:r>
+              <a:rPr lang="ja-JP" altLang="en-US">
+                <a:ea typeface="メイリオ"/>
+              </a:rPr>
+              <a:t>通常は有償ワークスペース同士でしか利用できない機能ですが、</a:t>
+            </a:r>
+            <a:r>
+              <a:rPr lang="en-US" altLang="ja-JP" err="1">
+                <a:ea typeface="メイリオ"/>
+              </a:rPr>
+              <a:t>UTokyo</a:t>
+            </a:r>
+            <a:r>
+              <a:rPr lang="en-US" altLang="ja-JP">
+                <a:ea typeface="メイリオ"/>
+              </a:rPr>
+              <a:t> Slack</a:t>
+            </a:r>
+            <a:r>
+              <a:rPr lang="ja-JP" altLang="en-US">
+                <a:ea typeface="メイリオ"/>
+              </a:rPr>
+              <a:t>のプランでは、相手のワークスペースが無償利用のワークスペースでも利用できます。</a:t>
+            </a:r>
+            <a:endParaRPr lang="en-US" altLang="ja-JP">
+              <a:ea typeface="メイリオ"/>
+            </a:endParaRPr>
+          </a:p>
+          <a:p>
+            <a:r>
+              <a:rPr lang="ja-JP" altLang="en-US">
+                <a:ea typeface="メイリオ"/>
+              </a:rPr>
+              <a:t>詳細→</a:t>
+            </a:r>
+            <a:r>
+              <a:rPr lang="ja-JP" altLang="en-US">
+                <a:ea typeface="メイリオ"/>
+                <a:hlinkClick r:id="rId2"/>
+              </a:rPr>
+              <a:t>「コネクト」機能を用いて学外者と一緒に</a:t>
+            </a:r>
+            <a:r>
+              <a:rPr lang="en-US" altLang="ja-JP">
+                <a:ea typeface="メイリオ"/>
+                <a:hlinkClick r:id="rId2"/>
+              </a:rPr>
+              <a:t>UTokyo Slack</a:t>
+            </a:r>
+            <a:r>
+              <a:rPr lang="ja-JP" altLang="en-US">
+                <a:ea typeface="メイリオ"/>
+                <a:hlinkClick r:id="rId2"/>
+              </a:rPr>
+              <a:t>を利用する</a:t>
+            </a:r>
+            <a:endParaRPr lang="en-US" altLang="ja-JP">
+              <a:ea typeface="メイリオ"/>
+            </a:endParaRPr>
+          </a:p>
+        </p:txBody>
+      </p:sp>
+      <p:sp>
+        <p:nvSpPr>
+          <p:cNvPr id="4" name="スライド番号プレースホルダー 3">
+            <a:extLst>
+              <a:ext uri="{FF2B5EF4-FFF2-40B4-BE49-F238E27FC236}">
+                <a16:creationId xmlns:a16="http://schemas.microsoft.com/office/drawing/2014/main" id="{289963F3-043E-4C99-B9AB-9C5B58340139}"/>
+              </a:ext>
+            </a:extLst>
+          </p:cNvPr>
+          <p:cNvSpPr>
+            <a:spLocks noGrp="1"/>
+          </p:cNvSpPr>
+          <p:nvPr>
+            <p:ph type="sldNum" sz="quarter" idx="12"/>
           </p:nvPr>
         </p:nvSpPr>
         <p:spPr/>
@@ -7636,6 +7767,11 @@
           <a:bodyPr/>
           <a:lstStyle/>
           <a:p>
+            <a:fld id="{7132C4A5-202B-4DA4-9DB0-0994E867E2A1}" type="slidenum">
+              <a:rPr lang="ja-JP" altLang="en-US" smtClean="0"/>
+              <a:pPr/>
+              <a:t>15</a:t>
+            </a:fld>
             <a:endParaRPr lang="ja-JP" altLang="en-US"/>
           </a:p>
         </p:txBody>
@@ -7643,7 +7779,7 @@
     </p:spTree>
     <p:extLst>
       <p:ext uri="{BB962C8B-B14F-4D97-AF65-F5344CB8AC3E}">
-        <p14:creationId xmlns:p14="http://schemas.microsoft.com/office/powerpoint/2010/main" val="2580591012"/>
+        <p14:creationId xmlns:p14="http://schemas.microsoft.com/office/powerpoint/2010/main" val="2566095105"/>
       </p:ext>
     </p:extLst>
   </p:cSld>
@@ -7672,10 +7808,10 @@
       </p:grpSpPr>
       <p:sp>
         <p:nvSpPr>
-          <p:cNvPr id="2" name="タイトル 1">
+          <p:cNvPr id="4" name="タイトル 3">
             <a:extLst>
               <a:ext uri="{FF2B5EF4-FFF2-40B4-BE49-F238E27FC236}">
-                <a16:creationId xmlns:a16="http://schemas.microsoft.com/office/drawing/2014/main" id="{66D72D3E-9A0A-A7AB-5D8C-F2C8C83FB00E}"/>
+                <a16:creationId xmlns:a16="http://schemas.microsoft.com/office/drawing/2014/main" id="{955B51E1-3E5D-C904-2EBE-3D1F59FE7FA3}"/>
               </a:ext>
             </a:extLst>
           </p:cNvPr>
@@ -7692,18 +7828,18 @@
           <a:lstStyle/>
           <a:p>
             <a:r>
-              <a:rPr kumimoji="1" lang="ja-JP" altLang="en-US"/>
-              <a:t>既存ワークスペースの編入（移行）</a:t>
-            </a:r>
-          </a:p>
-        </p:txBody>
-      </p:sp>
-      <p:sp>
-        <p:nvSpPr>
-          <p:cNvPr id="3" name="コンテンツ プレースホルダー 2">
+              <a:rPr lang="ja-JP" altLang="en-US"/>
+              <a:t>既存ワークスペースの対応</a:t>
+            </a:r>
+          </a:p>
+        </p:txBody>
+      </p:sp>
+      <p:sp>
+        <p:nvSpPr>
+          <p:cNvPr id="5" name="テキスト プレースホルダー 4">
             <a:extLst>
               <a:ext uri="{FF2B5EF4-FFF2-40B4-BE49-F238E27FC236}">
-                <a16:creationId xmlns:a16="http://schemas.microsoft.com/office/drawing/2014/main" id="{C5329C33-708E-7E9D-A0D7-976DFA18DB36}"/>
+                <a16:creationId xmlns:a16="http://schemas.microsoft.com/office/drawing/2014/main" id="{FA1A5C3A-6126-433A-B4C2-FDD2900CA5D6}"/>
               </a:ext>
             </a:extLst>
           </p:cNvPr>
@@ -7711,284 +7847,7 @@
             <a:spLocks noGrp="1"/>
           </p:cNvSpPr>
           <p:nvPr>
-            <p:ph idx="1"/>
-          </p:nvPr>
-        </p:nvSpPr>
-        <p:spPr/>
-        <p:txBody>
-          <a:bodyPr vert="horz" lIns="91440" tIns="45720" rIns="91440" bIns="45720" rtlCol="0" anchor="t">
-            <a:normAutofit/>
-          </a:bodyPr>
-          <a:lstStyle/>
-          <a:p>
-            <a:pPr marL="0" indent="0">
-              <a:buNone/>
-            </a:pPr>
-            <a:r>
-              <a:rPr lang="ja-JP" altLang="en-US">
-                <a:ea typeface="メイリオ"/>
-              </a:rPr>
-              <a:t>現在</a:t>
-            </a:r>
-            <a:r>
-              <a:rPr lang="en" altLang="ja-JP" dirty="0" err="1">
-                <a:ea typeface="メイリオ"/>
-              </a:rPr>
-              <a:t>UTokyo</a:t>
-            </a:r>
-            <a:r>
-              <a:rPr lang="en" altLang="ja-JP" dirty="0">
-                <a:ea typeface="メイリオ"/>
-              </a:rPr>
-              <a:t> Slack</a:t>
-            </a:r>
-            <a:r>
-              <a:rPr lang="ja-JP" altLang="en-US">
-                <a:ea typeface="メイリオ"/>
-              </a:rPr>
-              <a:t>以外でお使いいただいている既存のワークスペースがある場合、</a:t>
-            </a:r>
-            <a:r>
-              <a:rPr lang="ja-JP" altLang="en-US" b="1">
-                <a:ea typeface="メイリオ"/>
-              </a:rPr>
-              <a:t>「編入（移行）」手続き</a:t>
-            </a:r>
-            <a:r>
-              <a:rPr lang="ja-JP" altLang="en-US">
-                <a:ea typeface="メイリオ"/>
-              </a:rPr>
-              <a:t>を行うと、</a:t>
-            </a:r>
-            <a:r>
-              <a:rPr lang="en" altLang="ja-JP" dirty="0" err="1">
-                <a:ea typeface="メイリオ"/>
-              </a:rPr>
-              <a:t>UTokyo</a:t>
-            </a:r>
-            <a:r>
-              <a:rPr lang="en" altLang="ja-JP" dirty="0">
-                <a:ea typeface="メイリオ"/>
-              </a:rPr>
-              <a:t> Slack</a:t>
-            </a:r>
-            <a:r>
-              <a:rPr lang="ja-JP" altLang="en-US">
-                <a:ea typeface="メイリオ"/>
-              </a:rPr>
-              <a:t>として利用することができます。</a:t>
-            </a:r>
-            <a:endParaRPr lang="en-US" altLang="ja-JP">
-              <a:ea typeface="メイリオ"/>
-            </a:endParaRPr>
-          </a:p>
-          <a:p>
-            <a:r>
-              <a:rPr kumimoji="1" lang="ja-JP" altLang="en-US">
-                <a:ea typeface="メイリオ"/>
-              </a:rPr>
-              <a:t>詳細→</a:t>
-            </a:r>
-            <a:r>
-              <a:rPr lang="en" altLang="ja-JP" dirty="0">
-                <a:ea typeface="メイリオ"/>
-                <a:hlinkClick r:id="rId2"/>
-              </a:rPr>
-              <a:t>UTokyo Slack</a:t>
-            </a:r>
-            <a:r>
-              <a:rPr lang="ja-JP" altLang="en-US" dirty="0">
-                <a:ea typeface="メイリオ"/>
-                <a:hlinkClick r:id="rId2"/>
-              </a:rPr>
-              <a:t>への既存ワークスペースの編入（移行）</a:t>
-            </a:r>
-            <a:endParaRPr lang="en-US" altLang="ja-JP" dirty="0">
-              <a:ea typeface="メイリオ"/>
-            </a:endParaRPr>
-          </a:p>
-          <a:p>
-            <a:pPr lvl="1"/>
-            <a:r>
-              <a:rPr lang="en-US" altLang="ja-JP" dirty="0">
-                <a:ea typeface="メイリオ"/>
-              </a:rPr>
-              <a:t>9</a:t>
-            </a:r>
-            <a:r>
-              <a:rPr lang="ja-JP" altLang="en-US">
-                <a:ea typeface="メイリオ"/>
-              </a:rPr>
-              <a:t>月受付分は</a:t>
-            </a:r>
-            <a:r>
-              <a:rPr lang="en-US" altLang="ja-JP" dirty="0">
-                <a:ea typeface="メイリオ"/>
-              </a:rPr>
-              <a:t>9</a:t>
-            </a:r>
-            <a:r>
-              <a:rPr lang="ja-JP" altLang="en-US">
-                <a:ea typeface="メイリオ"/>
-              </a:rPr>
-              <a:t>月</a:t>
-            </a:r>
-            <a:r>
-              <a:rPr lang="en-US" altLang="ja-JP" dirty="0">
-                <a:ea typeface="メイリオ"/>
-              </a:rPr>
-              <a:t>9</a:t>
-            </a:r>
-            <a:r>
-              <a:rPr lang="ja-JP" altLang="en-US">
-                <a:ea typeface="メイリオ"/>
-              </a:rPr>
-              <a:t>日で一旦締め切りましたが、</a:t>
-            </a:r>
-            <a:r>
-              <a:rPr lang="en-US" altLang="ja-JP" dirty="0">
-                <a:ea typeface="メイリオ"/>
-              </a:rPr>
-              <a:t>10</a:t>
-            </a:r>
-            <a:r>
-              <a:rPr lang="ja-JP" altLang="en-US">
-                <a:ea typeface="メイリオ"/>
-              </a:rPr>
-              <a:t>月以降も受付は行う予定です。</a:t>
-            </a:r>
-            <a:endParaRPr lang="ja-JP" altLang="en-US">
-              <a:ea typeface="メイリオ"/>
-              <a:cs typeface="Calibri"/>
-            </a:endParaRPr>
-          </a:p>
-          <a:p>
-            <a:r>
-              <a:rPr kumimoji="1" lang="ja-JP" altLang="en-US">
-                <a:ea typeface="メイリオ"/>
-              </a:rPr>
-              <a:t>ただし、</a:t>
-            </a:r>
-            <a:r>
-              <a:rPr kumimoji="1" lang="en-US" altLang="ja-JP" dirty="0">
-                <a:ea typeface="メイリオ"/>
-              </a:rPr>
-              <a:t>Slack</a:t>
-            </a:r>
-            <a:r>
-              <a:rPr kumimoji="1" lang="ja-JP" altLang="en-US">
-                <a:ea typeface="メイリオ"/>
-              </a:rPr>
-              <a:t>側で個別に作業を行うため、</a:t>
-            </a:r>
-            <a:r>
-              <a:rPr kumimoji="1" lang="en-US" altLang="ja-JP" dirty="0" err="1">
-                <a:ea typeface="メイリオ"/>
-              </a:rPr>
-              <a:t>UTokyo</a:t>
-            </a:r>
-            <a:r>
-              <a:rPr kumimoji="1" lang="en-US" altLang="ja-JP" dirty="0">
-                <a:ea typeface="メイリオ"/>
-              </a:rPr>
-              <a:t> Slack</a:t>
-            </a:r>
-            <a:r>
-              <a:rPr kumimoji="1" lang="ja-JP" altLang="en-US">
-                <a:ea typeface="メイリオ"/>
-              </a:rPr>
-              <a:t>全体で</a:t>
-            </a:r>
-            <a:r>
-              <a:rPr kumimoji="1" lang="en-US" altLang="ja-JP" dirty="0">
-                <a:ea typeface="メイリオ"/>
-              </a:rPr>
-              <a:t>1</a:t>
-            </a:r>
-            <a:r>
-              <a:rPr kumimoji="1" lang="ja-JP" altLang="en-US">
-                <a:ea typeface="メイリオ"/>
-              </a:rPr>
-              <a:t>営業日あたり</a:t>
-            </a:r>
-            <a:r>
-              <a:rPr kumimoji="1" lang="en-US" altLang="ja-JP" dirty="0">
-                <a:ea typeface="メイリオ"/>
-              </a:rPr>
-              <a:t>1</a:t>
-            </a:r>
-            <a:r>
-              <a:rPr kumimoji="1" lang="ja-JP" altLang="en-US">
-                <a:ea typeface="メイリオ"/>
-              </a:rPr>
-              <a:t>ワークスペースが上限となり、実施までに相当の期間がかかります。</a:t>
-            </a:r>
-            <a:r>
-              <a:rPr lang="ja-JP" altLang="en-US">
-                <a:ea typeface="メイリオ"/>
-              </a:rPr>
-              <a:t>🙇</a:t>
-            </a:r>
-            <a:endParaRPr lang="en-US" altLang="ja-JP">
-              <a:ea typeface="メイリオ"/>
-            </a:endParaRPr>
-          </a:p>
-          <a:p>
-            <a:pPr lvl="1"/>
-            <a:r>
-              <a:rPr kumimoji="1" lang="ja-JP" altLang="en-US">
-                <a:ea typeface="メイリオ"/>
-              </a:rPr>
-              <a:t>説明会の参加者数などから、全ての希望の処理に</a:t>
-            </a:r>
-            <a:r>
-              <a:rPr kumimoji="1" lang="en-US" altLang="ja-JP" dirty="0">
-                <a:ea typeface="メイリオ"/>
-              </a:rPr>
-              <a:t>1</a:t>
-            </a:r>
-            <a:r>
-              <a:rPr kumimoji="1" lang="ja-JP" altLang="en-US">
-                <a:ea typeface="メイリオ"/>
-              </a:rPr>
-              <a:t>年以上かかる可能性も想定</a:t>
-            </a:r>
-            <a:endParaRPr kumimoji="1" lang="en-US" altLang="ja-JP">
-              <a:ea typeface="メイリオ"/>
-            </a:endParaRPr>
-          </a:p>
-          <a:p>
-            <a:pPr marL="0" indent="0">
-              <a:buNone/>
-            </a:pPr>
-            <a:r>
-              <a:rPr kumimoji="1" lang="ja-JP" altLang="en-US"/>
-              <a:t>手続きとしては受け付けていますが、他の方法による対応（次ページ）もあわせてご検討ください。</a:t>
-            </a:r>
-            <a:endParaRPr kumimoji="1" lang="en-US" altLang="ja-JP"/>
-          </a:p>
-          <a:p>
-            <a:endParaRPr kumimoji="1" lang="en-US" altLang="ja-JP"/>
-          </a:p>
-          <a:p>
-            <a:endParaRPr kumimoji="1" lang="ja-JP" altLang="en-US"/>
-          </a:p>
-        </p:txBody>
-      </p:sp>
-      <p:sp>
-        <p:nvSpPr>
-          <p:cNvPr id="4" name="スライド番号プレースホルダー 3">
-            <a:extLst>
-              <a:ext uri="{FF2B5EF4-FFF2-40B4-BE49-F238E27FC236}">
-                <a16:creationId xmlns:a16="http://schemas.microsoft.com/office/drawing/2014/main" id="{341A14C3-5AE1-C476-F352-436B14B2F63E}"/>
-              </a:ext>
-            </a:extLst>
-          </p:cNvPr>
-          <p:cNvSpPr>
-            <a:spLocks noGrp="1"/>
-          </p:cNvSpPr>
-          <p:nvPr>
-            <p:ph type="sldNum" sz="quarter" idx="12"/>
+            <p:ph type="body" idx="1"/>
           </p:nvPr>
         </p:nvSpPr>
         <p:spPr/>
@@ -7996,18 +7855,14 @@
           <a:bodyPr/>
           <a:lstStyle/>
           <a:p>
-            <a:fld id="{7132C4A5-202B-4DA4-9DB0-0994E867E2A1}" type="slidenum">
-              <a:rPr kumimoji="1" lang="ja-JP" altLang="en-US" smtClean="0"/>
-              <a:t>16</a:t>
-            </a:fld>
-            <a:endParaRPr kumimoji="1" lang="ja-JP" altLang="en-US"/>
+            <a:endParaRPr lang="ja-JP" altLang="en-US"/>
           </a:p>
         </p:txBody>
       </p:sp>
     </p:spTree>
     <p:extLst>
       <p:ext uri="{BB962C8B-B14F-4D97-AF65-F5344CB8AC3E}">
-        <p14:creationId xmlns:p14="http://schemas.microsoft.com/office/powerpoint/2010/main" val="222864949"/>
+        <p14:creationId xmlns:p14="http://schemas.microsoft.com/office/powerpoint/2010/main" val="2580591012"/>
       </p:ext>
     </p:extLst>
   </p:cSld>
@@ -8039,7 +7894,7 @@
           <p:cNvPr id="2" name="タイトル 1">
             <a:extLst>
               <a:ext uri="{FF2B5EF4-FFF2-40B4-BE49-F238E27FC236}">
-                <a16:creationId xmlns:a16="http://schemas.microsoft.com/office/drawing/2014/main" id="{E011FD2F-E1A3-365B-C692-4A4F98D3D1F2}"/>
+                <a16:creationId xmlns:a16="http://schemas.microsoft.com/office/drawing/2014/main" id="{66D72D3E-9A0A-A7AB-5D8C-F2C8C83FB00E}"/>
               </a:ext>
             </a:extLst>
           </p:cNvPr>
@@ -8056,8 +7911,8 @@
           <a:lstStyle/>
           <a:p>
             <a:r>
-              <a:rPr lang="ja-JP" altLang="en-US"/>
-              <a:t>編入（移行）以外の対応方法</a:t>
+              <a:rPr kumimoji="1" lang="ja-JP" altLang="en-US"/>
+              <a:t>既存ワークスペースの編入（移行）</a:t>
             </a:r>
           </a:p>
         </p:txBody>
@@ -8067,7 +7922,7 @@
           <p:cNvPr id="3" name="コンテンツ プレースホルダー 2">
             <a:extLst>
               <a:ext uri="{FF2B5EF4-FFF2-40B4-BE49-F238E27FC236}">
-                <a16:creationId xmlns:a16="http://schemas.microsoft.com/office/drawing/2014/main" id="{B1B57634-CFD0-0C4F-A2C5-14DC9915185C}"/>
+                <a16:creationId xmlns:a16="http://schemas.microsoft.com/office/drawing/2014/main" id="{C5329C33-708E-7E9D-A0D7-976DFA18DB36}"/>
               </a:ext>
             </a:extLst>
           </p:cNvPr>
@@ -8089,20 +7944,19 @@
               <a:buNone/>
             </a:pPr>
             <a:r>
-              <a:rPr lang="ja-JP" altLang="en-US"/>
-              <a:t>既存ワークスペースの今後の利用については、編入（移行）手続き以外による対応もあわせてご検討ください。</a:t>
-            </a:r>
-            <a:endParaRPr lang="en-US" altLang="ja-JP"/>
-          </a:p>
-          <a:p>
-            <a:r>
-              <a:rPr lang="en" altLang="ja-JP" dirty="0" err="1">
+              <a:rPr lang="ja-JP" altLang="en-US">
+                <a:ea typeface="メイリオ"/>
+              </a:rPr>
+              <a:t>現在</a:t>
+            </a:r>
+            <a:r>
+              <a:rPr lang="en" altLang="ja-JP" err="1">
                 <a:ea typeface="メイリオ"/>
               </a:rPr>
               <a:t>UTokyo</a:t>
             </a:r>
             <a:r>
-              <a:rPr lang="en" altLang="ja-JP" dirty="0">
+              <a:rPr lang="en" altLang="ja-JP">
                 <a:ea typeface="メイリオ"/>
               </a:rPr>
               <a:t> Slack</a:t>
@@ -8111,7 +7965,116 @@
               <a:rPr lang="ja-JP" altLang="en-US">
                 <a:ea typeface="メイリオ"/>
               </a:rPr>
-              <a:t>のワークスペースを新規に作成して利用することもご検討ください。</a:t>
+              <a:t>以外でお使いいただいている既存のワークスペースがある場合、</a:t>
+            </a:r>
+            <a:r>
+              <a:rPr lang="ja-JP" altLang="en-US" b="1">
+                <a:ea typeface="メイリオ"/>
+              </a:rPr>
+              <a:t>「編入（移行）」手続き</a:t>
+            </a:r>
+            <a:r>
+              <a:rPr lang="ja-JP" altLang="en-US">
+                <a:ea typeface="メイリオ"/>
+              </a:rPr>
+              <a:t>を行うと、</a:t>
+            </a:r>
+            <a:r>
+              <a:rPr lang="en" altLang="ja-JP" err="1">
+                <a:ea typeface="メイリオ"/>
+              </a:rPr>
+              <a:t>UTokyo</a:t>
+            </a:r>
+            <a:r>
+              <a:rPr lang="en" altLang="ja-JP">
+                <a:ea typeface="メイリオ"/>
+              </a:rPr>
+              <a:t> Slack</a:t>
+            </a:r>
+            <a:r>
+              <a:rPr lang="ja-JP" altLang="en-US">
+                <a:ea typeface="メイリオ"/>
+              </a:rPr>
+              <a:t>として利用することができます。</a:t>
+            </a:r>
+            <a:endParaRPr lang="en-US" altLang="ja-JP">
+              <a:ea typeface="メイリオ"/>
+            </a:endParaRPr>
+          </a:p>
+          <a:p>
+            <a:r>
+              <a:rPr kumimoji="1" lang="ja-JP" altLang="en-US">
+                <a:ea typeface="メイリオ"/>
+              </a:rPr>
+              <a:t>詳細→</a:t>
+            </a:r>
+            <a:r>
+              <a:rPr lang="en" altLang="ja-JP">
+                <a:ea typeface="メイリオ"/>
+                <a:hlinkClick r:id="rId2"/>
+              </a:rPr>
+              <a:t>UTokyo Slack</a:t>
+            </a:r>
+            <a:r>
+              <a:rPr lang="ja-JP" altLang="en-US">
+                <a:ea typeface="メイリオ"/>
+                <a:hlinkClick r:id="rId2"/>
+              </a:rPr>
+              <a:t>への既存ワークスペースの編入（移行）</a:t>
+            </a:r>
+            <a:endParaRPr lang="en-US" altLang="ja-JP">
+              <a:ea typeface="メイリオ"/>
+            </a:endParaRPr>
+          </a:p>
+          <a:p>
+            <a:pPr lvl="1"/>
+            <a:r>
+              <a:rPr lang="en-US" altLang="ja-JP">
+                <a:ea typeface="メイリオ"/>
+              </a:rPr>
+              <a:t>9</a:t>
+            </a:r>
+            <a:r>
+              <a:rPr lang="ja-JP" altLang="en-US">
+                <a:ea typeface="メイリオ"/>
+              </a:rPr>
+              <a:t>月</a:t>
+            </a:r>
+            <a:r>
+              <a:rPr lang="en-US" altLang="ja-JP">
+                <a:ea typeface="メイリオ"/>
+              </a:rPr>
+              <a:t>9</a:t>
+            </a:r>
+            <a:r>
+              <a:rPr lang="ja-JP" altLang="en-US">
+                <a:ea typeface="メイリオ"/>
+              </a:rPr>
+              <a:t>日で一旦締め切りました（申込数</a:t>
+            </a:r>
+            <a:r>
+              <a:rPr lang="en-US" altLang="ja-JP">
+                <a:ea typeface="メイリオ"/>
+              </a:rPr>
+              <a:t>42</a:t>
+            </a:r>
+            <a:r>
+              <a:rPr lang="ja-JP" altLang="en-US">
+                <a:ea typeface="メイリオ"/>
+              </a:rPr>
+              <a:t>件）。受付は</a:t>
+            </a:r>
+            <a:r>
+              <a:rPr lang="en-US" altLang="ja-JP">
+                <a:ea typeface="メイリオ"/>
+              </a:rPr>
+              <a:t>10</a:t>
+            </a:r>
+            <a:r>
+              <a:rPr lang="ja-JP" altLang="en-US">
+                <a:ea typeface="メイリオ"/>
+              </a:rPr>
+              <a:t>月以降も続ける予定です。</a:t>
             </a:r>
             <a:endParaRPr lang="ja-JP" altLang="en-US">
               <a:ea typeface="メイリオ"/>
@@ -8119,88 +8082,139 @@
             </a:endParaRPr>
           </a:p>
           <a:p>
+            <a:r>
+              <a:rPr kumimoji="1" lang="en-US" altLang="ja-JP">
+                <a:ea typeface="メイリオ"/>
+              </a:rPr>
+              <a:t>Slack</a:t>
+            </a:r>
+            <a:r>
+              <a:rPr kumimoji="1" lang="ja-JP" altLang="en-US">
+                <a:ea typeface="メイリオ"/>
+              </a:rPr>
+              <a:t>側で個別に作業を行うため、</a:t>
+            </a:r>
+            <a:r>
+              <a:rPr kumimoji="1" lang="en-US" altLang="ja-JP" err="1">
+                <a:ea typeface="メイリオ"/>
+              </a:rPr>
+              <a:t>UTokyo</a:t>
+            </a:r>
+            <a:r>
+              <a:rPr kumimoji="1" lang="en-US" altLang="ja-JP">
+                <a:ea typeface="メイリオ"/>
+              </a:rPr>
+              <a:t> Slack</a:t>
+            </a:r>
+            <a:r>
+              <a:rPr kumimoji="1" lang="ja-JP" altLang="en-US">
+                <a:ea typeface="メイリオ"/>
+              </a:rPr>
+              <a:t>全体で</a:t>
+            </a:r>
+            <a:r>
+              <a:rPr kumimoji="1" lang="en-US" altLang="ja-JP" b="1">
+                <a:ea typeface="メイリオ"/>
+              </a:rPr>
+              <a:t>1</a:t>
+            </a:r>
+            <a:r>
+              <a:rPr kumimoji="1" lang="ja-JP" altLang="en-US" b="1">
+                <a:ea typeface="メイリオ"/>
+              </a:rPr>
+              <a:t>営業日あたり</a:t>
+            </a:r>
+            <a:r>
+              <a:rPr kumimoji="1" lang="en-US" altLang="ja-JP" b="1">
+                <a:ea typeface="メイリオ"/>
+              </a:rPr>
+              <a:t>2</a:t>
+            </a:r>
+            <a:r>
+              <a:rPr kumimoji="1" lang="ja-JP" altLang="en-US" b="1">
+                <a:ea typeface="メイリオ"/>
+              </a:rPr>
+              <a:t>ワークスペース</a:t>
+            </a:r>
+            <a:r>
+              <a:rPr kumimoji="1" lang="ja-JP" altLang="en-US">
+                <a:ea typeface="メイリオ"/>
+              </a:rPr>
+              <a:t>が上限となり、実施までに相当の期間がかかります。</a:t>
+            </a:r>
+            <a:r>
+              <a:rPr lang="ja-JP" altLang="en-US">
+                <a:ea typeface="メイリオ"/>
+              </a:rPr>
+              <a:t>🙇</a:t>
+            </a:r>
+            <a:endParaRPr lang="en-US" altLang="ja-JP">
+              <a:ea typeface="メイリオ"/>
+            </a:endParaRPr>
+          </a:p>
+          <a:p>
             <a:pPr lvl="1"/>
             <a:r>
-              <a:rPr lang="ja-JP" altLang="en-US">
-                <a:ea typeface="メイリオ"/>
-              </a:rPr>
-              <a:t>既存ワークスペースのメッセージは、プログラムを使って</a:t>
-            </a:r>
-            <a:r>
-              <a:rPr lang="ja-JP" altLang="en-US" b="1">
-                <a:ea typeface="メイリオ"/>
-              </a:rPr>
-              <a:t>擬似的に再現（移植</a:t>
-            </a:r>
-            <a:r>
-              <a:rPr lang="ja-JP" altLang="en-US">
-                <a:ea typeface="メイリオ"/>
-              </a:rPr>
-              <a:t>）する方法があります。（</a:t>
-            </a:r>
-            <a:r>
-              <a:rPr lang="en-US" altLang="ja-JP" dirty="0">
-                <a:ea typeface="メイリオ"/>
-                <a:hlinkClick r:id="rId2"/>
-              </a:rPr>
-              <a:t>UTokyo Slack</a:t>
-            </a:r>
-            <a:r>
-              <a:rPr lang="ja-JP" altLang="en-US" dirty="0">
-                <a:ea typeface="メイリオ"/>
-                <a:hlinkClick r:id="rId2"/>
-              </a:rPr>
-              <a:t>説明会パート</a:t>
-            </a:r>
-            <a:r>
-              <a:rPr lang="en-US" altLang="ja-JP" dirty="0">
-                <a:ea typeface="メイリオ"/>
-                <a:hlinkClick r:id="rId2"/>
-              </a:rPr>
-              <a:t>2</a:t>
-            </a:r>
-            <a:r>
-              <a:rPr lang="ja-JP" altLang="en-US">
-                <a:ea typeface="メイリオ"/>
-              </a:rPr>
-              <a:t>で紹介）</a:t>
-            </a:r>
-            <a:endParaRPr lang="ja-JP" altLang="en-US">
+              <a:rPr kumimoji="1" lang="ja-JP" altLang="en-US">
+                <a:ea typeface="メイリオ"/>
+              </a:rPr>
+              <a:t>当初は</a:t>
+            </a:r>
+            <a:r>
+              <a:rPr kumimoji="1" lang="en-US" altLang="ja-JP">
+                <a:ea typeface="メイリオ"/>
+              </a:rPr>
+              <a:t>1</a:t>
+            </a:r>
+            <a:r>
+              <a:rPr kumimoji="1" lang="ja-JP" altLang="en-US">
+                <a:ea typeface="メイリオ"/>
+              </a:rPr>
+              <a:t>営業日あたり</a:t>
+            </a:r>
+            <a:r>
+              <a:rPr kumimoji="1" lang="en-US" altLang="ja-JP">
+                <a:ea typeface="メイリオ"/>
+              </a:rPr>
+              <a:t>1</a:t>
+            </a:r>
+            <a:r>
+              <a:rPr kumimoji="1" lang="ja-JP" altLang="en-US">
+                <a:ea typeface="メイリオ"/>
+              </a:rPr>
+              <a:t>ワークスペースと案内していましたが、申込状況を踏まえ</a:t>
+            </a:r>
+            <a:r>
+              <a:rPr kumimoji="1" lang="en-US" altLang="ja-JP">
+                <a:ea typeface="メイリオ"/>
+              </a:rPr>
+              <a:t>Slack</a:t>
+            </a:r>
+            <a:r>
+              <a:rPr kumimoji="1" lang="ja-JP" altLang="en-US">
+                <a:ea typeface="メイリオ"/>
+              </a:rPr>
+              <a:t>側で対応リソースを増強していただけました。</a:t>
+            </a:r>
+            <a:endParaRPr kumimoji="1" lang="en-US" altLang="ja-JP">
               <a:ea typeface="メイリオ"/>
-              <a:cs typeface="Calibri"/>
             </a:endParaRPr>
           </a:p>
           <a:p>
-            <a:r>
-              <a:rPr lang="ja-JP" altLang="en-US"/>
-              <a:t>現在の無償利用・有償契約の各プランで引き続き利用することができないか、ご検討ください。また、個別に有償契約を行うこともご検討ください。 </a:t>
-            </a:r>
-          </a:p>
-          <a:p>
-            <a:pPr lvl="1"/>
-            <a:r>
-              <a:rPr lang="ja-JP" altLang="en-US">
-                <a:ea typeface="メイリオ"/>
-              </a:rPr>
-              <a:t>個別の有償契約で</a:t>
-            </a:r>
-            <a:r>
-              <a:rPr lang="ja-JP" altLang="en-US" dirty="0">
-                <a:ea typeface="メイリオ"/>
-                <a:hlinkClick r:id="rId3"/>
-              </a:rPr>
-              <a:t>教育支援プログラムによる割引</a:t>
-            </a:r>
-            <a:r>
-              <a:rPr lang="ja-JP" altLang="en-US">
-                <a:ea typeface="メイリオ"/>
-              </a:rPr>
-              <a:t>を受けるための手続き（証明書など）をスムーズに行えないか検討・調整中</a:t>
-            </a:r>
-            <a:endParaRPr lang="ja-JP" altLang="en-US">
-              <a:ea typeface="メイリオ"/>
-              <a:cs typeface="Calibri"/>
-            </a:endParaRPr>
+            <a:pPr marL="0" indent="0">
+              <a:buNone/>
+            </a:pPr>
+            <a:r>
+              <a:rPr kumimoji="1" lang="ja-JP" altLang="en-US"/>
+              <a:t>手続きとしては受け付けていますが、他の方法による対応（次ページ）もあわせてご検討ください。</a:t>
+            </a:r>
+            <a:endParaRPr kumimoji="1" lang="en-US" altLang="ja-JP"/>
+          </a:p>
+          <a:p>
+            <a:endParaRPr kumimoji="1" lang="en-US" altLang="ja-JP"/>
+          </a:p>
+          <a:p>
+            <a:endParaRPr kumimoji="1" lang="ja-JP" altLang="en-US"/>
           </a:p>
         </p:txBody>
       </p:sp>
@@ -8209,7 +8223,7 @@
           <p:cNvPr id="4" name="スライド番号プレースホルダー 3">
             <a:extLst>
               <a:ext uri="{FF2B5EF4-FFF2-40B4-BE49-F238E27FC236}">
-                <a16:creationId xmlns:a16="http://schemas.microsoft.com/office/drawing/2014/main" id="{C3721066-77E2-2A21-964B-59C317C55F60}"/>
+                <a16:creationId xmlns:a16="http://schemas.microsoft.com/office/drawing/2014/main" id="{341A14C3-5AE1-C476-F352-436B14B2F63E}"/>
               </a:ext>
             </a:extLst>
           </p:cNvPr>
@@ -8226,18 +8240,17 @@
           <a:lstStyle/>
           <a:p>
             <a:fld id="{7132C4A5-202B-4DA4-9DB0-0994E867E2A1}" type="slidenum">
-              <a:rPr lang="ja-JP" altLang="en-US" smtClean="0"/>
-              <a:pPr/>
+              <a:rPr kumimoji="1" lang="ja-JP" altLang="en-US" smtClean="0"/>
               <a:t>17</a:t>
             </a:fld>
-            <a:endParaRPr lang="ja-JP" altLang="en-US"/>
+            <a:endParaRPr kumimoji="1" lang="ja-JP" altLang="en-US"/>
           </a:p>
         </p:txBody>
       </p:sp>
     </p:spTree>
     <p:extLst>
       <p:ext uri="{BB962C8B-B14F-4D97-AF65-F5344CB8AC3E}">
-        <p14:creationId xmlns:p14="http://schemas.microsoft.com/office/powerpoint/2010/main" val="2598032923"/>
+        <p14:creationId xmlns:p14="http://schemas.microsoft.com/office/powerpoint/2010/main" val="222864949"/>
       </p:ext>
     </p:extLst>
   </p:cSld>
@@ -8266,10 +8279,10 @@
       </p:grpSpPr>
       <p:sp>
         <p:nvSpPr>
-          <p:cNvPr id="4" name="タイトル 3">
+          <p:cNvPr id="2" name="タイトル 1">
             <a:extLst>
               <a:ext uri="{FF2B5EF4-FFF2-40B4-BE49-F238E27FC236}">
-                <a16:creationId xmlns:a16="http://schemas.microsoft.com/office/drawing/2014/main" id="{955B51E1-3E5D-C904-2EBE-3D1F59FE7FA3}"/>
+                <a16:creationId xmlns:a16="http://schemas.microsoft.com/office/drawing/2014/main" id="{E011FD2F-E1A3-365B-C692-4A4F98D3D1F2}"/>
               </a:ext>
             </a:extLst>
           </p:cNvPr>
@@ -8287,17 +8300,17 @@
           <a:p>
             <a:r>
               <a:rPr lang="ja-JP" altLang="en-US"/>
-              <a:t>よくある質問とその答え</a:t>
-            </a:r>
-          </a:p>
-        </p:txBody>
-      </p:sp>
-      <p:sp>
-        <p:nvSpPr>
-          <p:cNvPr id="5" name="テキスト プレースホルダー 4">
+              <a:t>編入（移行）以外の対応方法</a:t>
+            </a:r>
+          </a:p>
+        </p:txBody>
+      </p:sp>
+      <p:sp>
+        <p:nvSpPr>
+          <p:cNvPr id="3" name="コンテンツ プレースホルダー 2">
             <a:extLst>
               <a:ext uri="{FF2B5EF4-FFF2-40B4-BE49-F238E27FC236}">
-                <a16:creationId xmlns:a16="http://schemas.microsoft.com/office/drawing/2014/main" id="{FA1A5C3A-6126-433A-B4C2-FDD2900CA5D6}"/>
+                <a16:creationId xmlns:a16="http://schemas.microsoft.com/office/drawing/2014/main" id="{B1B57634-CFD0-0C4F-A2C5-14DC9915185C}"/>
               </a:ext>
             </a:extLst>
           </p:cNvPr>
@@ -8305,7 +8318,149 @@
             <a:spLocks noGrp="1"/>
           </p:cNvSpPr>
           <p:nvPr>
-            <p:ph type="body" idx="1"/>
+            <p:ph idx="1"/>
+          </p:nvPr>
+        </p:nvSpPr>
+        <p:spPr/>
+        <p:txBody>
+          <a:bodyPr vert="horz" lIns="91440" tIns="45720" rIns="91440" bIns="45720" rtlCol="0" anchor="t">
+            <a:normAutofit/>
+          </a:bodyPr>
+          <a:lstStyle/>
+          <a:p>
+            <a:pPr marL="0" indent="0">
+              <a:buNone/>
+            </a:pPr>
+            <a:r>
+              <a:rPr lang="ja-JP" altLang="en-US"/>
+              <a:t>既存ワークスペースの今後の利用については、編入（移行）手続き以外による対応もあわせてご検討ください。</a:t>
+            </a:r>
+            <a:endParaRPr lang="en-US" altLang="ja-JP"/>
+          </a:p>
+          <a:p>
+            <a:r>
+              <a:rPr lang="en" altLang="ja-JP" err="1">
+                <a:ea typeface="メイリオ"/>
+              </a:rPr>
+              <a:t>UTokyo</a:t>
+            </a:r>
+            <a:r>
+              <a:rPr lang="en" altLang="ja-JP">
+                <a:ea typeface="メイリオ"/>
+              </a:rPr>
+              <a:t> Slack</a:t>
+            </a:r>
+            <a:r>
+              <a:rPr lang="ja-JP" altLang="en-US">
+                <a:ea typeface="メイリオ"/>
+              </a:rPr>
+              <a:t>のワークスペースを新規に作成して利用することもご検討ください。</a:t>
+            </a:r>
+            <a:endParaRPr lang="ja-JP" altLang="en-US">
+              <a:ea typeface="メイリオ"/>
+              <a:cs typeface="Calibri"/>
+            </a:endParaRPr>
+          </a:p>
+          <a:p>
+            <a:pPr lvl="1"/>
+            <a:r>
+              <a:rPr lang="ja-JP" altLang="en-US">
+                <a:ea typeface="メイリオ"/>
+              </a:rPr>
+              <a:t>既存ワークスペースのメッセージは、プログラムを使って</a:t>
+            </a:r>
+            <a:r>
+              <a:rPr lang="ja-JP" altLang="en-US" b="1">
+                <a:ea typeface="メイリオ"/>
+              </a:rPr>
+              <a:t>擬似的に再現（移植</a:t>
+            </a:r>
+            <a:r>
+              <a:rPr lang="ja-JP" altLang="en-US">
+                <a:ea typeface="メイリオ"/>
+              </a:rPr>
+              <a:t>）する方法があります。（</a:t>
+            </a:r>
+            <a:r>
+              <a:rPr lang="en-US" altLang="ja-JP">
+                <a:ea typeface="メイリオ"/>
+                <a:hlinkClick r:id="rId2"/>
+              </a:rPr>
+              <a:t>UTokyo Slack</a:t>
+            </a:r>
+            <a:r>
+              <a:rPr lang="ja-JP" altLang="en-US">
+                <a:ea typeface="メイリオ"/>
+                <a:hlinkClick r:id="rId2"/>
+              </a:rPr>
+              <a:t>説明会パート</a:t>
+            </a:r>
+            <a:r>
+              <a:rPr lang="en-US" altLang="ja-JP">
+                <a:ea typeface="メイリオ"/>
+                <a:hlinkClick r:id="rId2"/>
+              </a:rPr>
+              <a:t>2</a:t>
+            </a:r>
+            <a:r>
+              <a:rPr lang="ja-JP" altLang="en-US">
+                <a:ea typeface="メイリオ"/>
+              </a:rPr>
+              <a:t>で紹介）</a:t>
+            </a:r>
+            <a:endParaRPr lang="ja-JP" altLang="en-US">
+              <a:ea typeface="メイリオ"/>
+              <a:cs typeface="Calibri"/>
+            </a:endParaRPr>
+          </a:p>
+          <a:p>
+            <a:r>
+              <a:rPr lang="ja-JP" altLang="en-US"/>
+              <a:t>現在の無償利用・有償契約の各プランで引き続き利用することができないか、ご検討ください。また、個別に有償契約を行うこともご検討ください。 </a:t>
+            </a:r>
+          </a:p>
+          <a:p>
+            <a:pPr lvl="1"/>
+            <a:r>
+              <a:rPr lang="ja-JP" altLang="en-US">
+                <a:ea typeface="メイリオ"/>
+              </a:rPr>
+              <a:t>個別の有償契約で</a:t>
+            </a:r>
+            <a:r>
+              <a:rPr lang="ja-JP" altLang="en-US">
+                <a:ea typeface="メイリオ"/>
+                <a:hlinkClick r:id="rId3"/>
+              </a:rPr>
+              <a:t>教育支援プログラムによる割引</a:t>
+            </a:r>
+            <a:r>
+              <a:rPr lang="ja-JP" altLang="en-US">
+                <a:ea typeface="メイリオ"/>
+              </a:rPr>
+              <a:t>を受けるための手続き（証明書など）をスムーズに行えないか検討・調整中</a:t>
+            </a:r>
+            <a:endParaRPr lang="ja-JP" altLang="en-US">
+              <a:ea typeface="メイリオ"/>
+              <a:cs typeface="Calibri"/>
+            </a:endParaRPr>
+          </a:p>
+        </p:txBody>
+      </p:sp>
+      <p:sp>
+        <p:nvSpPr>
+          <p:cNvPr id="4" name="スライド番号プレースホルダー 3">
+            <a:extLst>
+              <a:ext uri="{FF2B5EF4-FFF2-40B4-BE49-F238E27FC236}">
+                <a16:creationId xmlns:a16="http://schemas.microsoft.com/office/drawing/2014/main" id="{C3721066-77E2-2A21-964B-59C317C55F60}"/>
+              </a:ext>
+            </a:extLst>
+          </p:cNvPr>
+          <p:cNvSpPr>
+            <a:spLocks noGrp="1"/>
+          </p:cNvSpPr>
+          <p:nvPr>
+            <p:ph type="sldNum" sz="quarter" idx="12"/>
           </p:nvPr>
         </p:nvSpPr>
         <p:spPr/>
@@ -8313,6 +8468,11 @@
           <a:bodyPr/>
           <a:lstStyle/>
           <a:p>
+            <a:fld id="{7132C4A5-202B-4DA4-9DB0-0994E867E2A1}" type="slidenum">
+              <a:rPr lang="ja-JP" altLang="en-US" smtClean="0"/>
+              <a:pPr/>
+              <a:t>18</a:t>
+            </a:fld>
             <a:endParaRPr lang="ja-JP" altLang="en-US"/>
           </a:p>
         </p:txBody>
@@ -8320,7 +8480,7 @@
     </p:spTree>
     <p:extLst>
       <p:ext uri="{BB962C8B-B14F-4D97-AF65-F5344CB8AC3E}">
-        <p14:creationId xmlns:p14="http://schemas.microsoft.com/office/powerpoint/2010/main" val="362400055"/>
+        <p14:creationId xmlns:p14="http://schemas.microsoft.com/office/powerpoint/2010/main" val="2598032923"/>
       </p:ext>
     </p:extLst>
   </p:cSld>
@@ -8349,10 +8509,10 @@
       </p:grpSpPr>
       <p:sp>
         <p:nvSpPr>
-          <p:cNvPr id="2" name="Title 1">
+          <p:cNvPr id="4" name="タイトル 3">
             <a:extLst>
               <a:ext uri="{FF2B5EF4-FFF2-40B4-BE49-F238E27FC236}">
-                <a16:creationId xmlns:a16="http://schemas.microsoft.com/office/drawing/2014/main" id="{5F66CF5E-735E-277C-7A5D-E2A2BE6A744F}"/>
+                <a16:creationId xmlns:a16="http://schemas.microsoft.com/office/drawing/2014/main" id="{955B51E1-3E5D-C904-2EBE-3D1F59FE7FA3}"/>
               </a:ext>
             </a:extLst>
           </p:cNvPr>
@@ -8370,17 +8530,17 @@
           <a:p>
             <a:r>
               <a:rPr lang="ja-JP" altLang="en-US"/>
-              <a:t>セキュリティ・コンプライアンスの対応</a:t>
-            </a:r>
-          </a:p>
-        </p:txBody>
-      </p:sp>
-      <p:sp>
-        <p:nvSpPr>
-          <p:cNvPr id="3" name="Content Placeholder 2">
+              <a:t>よくある質問とその答え</a:t>
+            </a:r>
+          </a:p>
+        </p:txBody>
+      </p:sp>
+      <p:sp>
+        <p:nvSpPr>
+          <p:cNvPr id="5" name="テキスト プレースホルダー 4">
             <a:extLst>
               <a:ext uri="{FF2B5EF4-FFF2-40B4-BE49-F238E27FC236}">
-                <a16:creationId xmlns:a16="http://schemas.microsoft.com/office/drawing/2014/main" id="{2C4D2774-7CDA-8444-B067-0CF381F153DE}"/>
+                <a16:creationId xmlns:a16="http://schemas.microsoft.com/office/drawing/2014/main" id="{FA1A5C3A-6126-433A-B4C2-FDD2900CA5D6}"/>
               </a:ext>
             </a:extLst>
           </p:cNvPr>
@@ -8388,192 +8548,7 @@
             <a:spLocks noGrp="1"/>
           </p:cNvSpPr>
           <p:nvPr>
-            <p:ph idx="1"/>
-          </p:nvPr>
-        </p:nvSpPr>
-        <p:spPr/>
-        <p:txBody>
-          <a:bodyPr vert="horz" lIns="91440" tIns="45720" rIns="91440" bIns="45720" rtlCol="0" anchor="t">
-            <a:normAutofit/>
-          </a:bodyPr>
-          <a:lstStyle/>
-          <a:p>
-            <a:pPr marL="0" indent="0">
-              <a:buNone/>
-            </a:pPr>
-            <a:r>
-              <a:rPr lang="en-US" dirty="0"/>
-              <a:t>Slack</a:t>
-            </a:r>
-            <a:r>
-              <a:rPr lang="ja-JP" altLang="en-US">
-                <a:ea typeface="メイリオ"/>
-              </a:rPr>
-              <a:t>でのセキュリティ事案・コンプライアンス事案も他の情報サービスと同じ対応をします。</a:t>
-            </a:r>
-            <a:endParaRPr lang="en-US" altLang="ja-JP">
-              <a:ea typeface="メイリオ"/>
-            </a:endParaRPr>
-          </a:p>
-          <a:p>
-            <a:r>
-              <a:rPr lang="en-US" altLang="ja-JP" dirty="0" err="1">
-                <a:ea typeface="メイリオ"/>
-              </a:rPr>
-              <a:t>学内の諸規則に則り、事案の当事者</a:t>
-            </a:r>
-            <a:r>
-              <a:rPr lang="ja-JP" altLang="en-US">
-                <a:ea typeface="メイリオ"/>
-              </a:rPr>
-              <a:t>本人</a:t>
-            </a:r>
-            <a:r>
-              <a:rPr lang="en-US" altLang="ja-JP" dirty="0" err="1">
-                <a:ea typeface="メイリオ"/>
-              </a:rPr>
-              <a:t>に対して対応</a:t>
-            </a:r>
-            <a:r>
-              <a:rPr lang="ja-JP" altLang="en-US">
-                <a:ea typeface="メイリオ"/>
-              </a:rPr>
-              <a:t>が</a:t>
-            </a:r>
-            <a:r>
-              <a:rPr lang="en-US" altLang="ja-JP" dirty="0">
-                <a:ea typeface="メイリオ"/>
-              </a:rPr>
-              <a:t>行</a:t>
-            </a:r>
-            <a:r>
-              <a:rPr lang="ja-JP" altLang="en-US">
-                <a:ea typeface="メイリオ"/>
-              </a:rPr>
-              <a:t>われ</a:t>
-            </a:r>
-            <a:r>
-              <a:rPr lang="en-US" altLang="ja-JP" dirty="0" err="1">
-                <a:ea typeface="メイリオ"/>
-              </a:rPr>
-              <a:t>ます</a:t>
-            </a:r>
-            <a:r>
-              <a:rPr lang="en-US" altLang="ja-JP" dirty="0">
-                <a:ea typeface="メイリオ"/>
-              </a:rPr>
-              <a:t>。</a:t>
-            </a:r>
-            <a:endParaRPr lang="en-US" altLang="ja-JP" dirty="0">
-              <a:ea typeface="メイリオ"/>
-              <a:cs typeface="Calibri"/>
-            </a:endParaRPr>
-          </a:p>
-          <a:p>
-            <a:r>
-              <a:rPr lang="ja-JP" altLang="en-US" b="1">
-                <a:ea typeface="メイリオ"/>
-              </a:rPr>
-              <a:t>ワークスペースの責任者（作成を申請した教職員）は、必要に応じて対応へのご協力をお願いします。</a:t>
-            </a:r>
-            <a:endParaRPr lang="en-US" altLang="ja-JP" b="1">
-              <a:ea typeface="メイリオ"/>
-            </a:endParaRPr>
-          </a:p>
-          <a:p>
-            <a:pPr lvl="1"/>
-            <a:r>
-              <a:rPr lang="ja-JP" altLang="en-US">
-                <a:ea typeface="メイリオ"/>
-              </a:rPr>
-              <a:t>事案が発生した場合の適切な窓口（部局</a:t>
-            </a:r>
-            <a:r>
-              <a:rPr lang="en-US" altLang="ja-JP" dirty="0">
-                <a:ea typeface="メイリオ"/>
-              </a:rPr>
-              <a:t>CISO</a:t>
-            </a:r>
-            <a:r>
-              <a:rPr lang="ja-JP" altLang="en-US">
-                <a:ea typeface="メイリオ"/>
-              </a:rPr>
-              <a:t>・部局</a:t>
-            </a:r>
-            <a:r>
-              <a:rPr lang="en-US" altLang="ja-JP" dirty="0">
-                <a:ea typeface="メイリオ"/>
-              </a:rPr>
-              <a:t>CERT</a:t>
-            </a:r>
-            <a:r>
-              <a:rPr lang="ja-JP" altLang="en-US">
-                <a:ea typeface="メイリオ"/>
-              </a:rPr>
-              <a:t>等）への報告</a:t>
-            </a:r>
-            <a:endParaRPr lang="en-US" altLang="ja-JP">
-              <a:ea typeface="メイリオ"/>
-            </a:endParaRPr>
-          </a:p>
-          <a:p>
-            <a:pPr lvl="1"/>
-            <a:r>
-              <a:rPr lang="ja-JP" altLang="en-US"/>
-              <a:t>調査への協力　など</a:t>
-            </a:r>
-          </a:p>
-          <a:p>
-            <a:r>
-              <a:rPr lang="ja-JP" altLang="en-US">
-                <a:ea typeface="メイリオ"/>
-              </a:rPr>
-              <a:t>諸規則に基づいて</a:t>
-            </a:r>
-            <a:r>
-              <a:rPr lang="en-US" altLang="ja-JP" dirty="0">
-                <a:ea typeface="メイリオ"/>
-              </a:rPr>
-              <a:t>CISO</a:t>
-            </a:r>
-            <a:r>
-              <a:rPr lang="ja-JP" altLang="en-US">
-                <a:ea typeface="メイリオ"/>
-              </a:rPr>
-              <a:t>が決定した処置・</a:t>
-            </a:r>
-            <a:r>
-              <a:rPr lang="en-US" altLang="ja-JP" dirty="0">
-                <a:ea typeface="メイリオ"/>
-              </a:rPr>
-              <a:t>CERT</a:t>
-            </a:r>
-            <a:r>
-              <a:rPr lang="ja-JP" altLang="en-US">
-                <a:ea typeface="メイリオ"/>
-              </a:rPr>
-              <a:t>の行う緊急対応などに対しては、サービス責任者（情報システム本部長）の判断のもと、必要な対応を行います。</a:t>
-            </a:r>
-            <a:endParaRPr lang="en-US" altLang="ja-JP">
-              <a:ea typeface="メイリオ"/>
-            </a:endParaRPr>
-          </a:p>
-        </p:txBody>
-      </p:sp>
-      <p:sp>
-        <p:nvSpPr>
-          <p:cNvPr id="4" name="Slide Number Placeholder 3">
-            <a:extLst>
-              <a:ext uri="{FF2B5EF4-FFF2-40B4-BE49-F238E27FC236}">
-                <a16:creationId xmlns:a16="http://schemas.microsoft.com/office/drawing/2014/main" id="{45B2B187-903F-A39D-8D11-12A940036F49}"/>
-              </a:ext>
-            </a:extLst>
-          </p:cNvPr>
-          <p:cNvSpPr>
-            <a:spLocks noGrp="1"/>
-          </p:cNvSpPr>
-          <p:nvPr>
-            <p:ph type="sldNum" sz="quarter" idx="12"/>
+            <p:ph type="body" idx="1"/>
           </p:nvPr>
         </p:nvSpPr>
         <p:spPr/>
@@ -8581,11 +8556,6 @@
           <a:bodyPr/>
           <a:lstStyle/>
           <a:p>
-            <a:fld id="{7132C4A5-202B-4DA4-9DB0-0994E867E2A1}" type="slidenum">
-              <a:rPr lang="ja-JP" altLang="en-US" smtClean="0"/>
-              <a:pPr/>
-              <a:t>19</a:t>
-            </a:fld>
             <a:endParaRPr lang="ja-JP" altLang="en-US"/>
           </a:p>
         </p:txBody>
@@ -8593,7 +8563,7 @@
     </p:spTree>
     <p:extLst>
       <p:ext uri="{BB962C8B-B14F-4D97-AF65-F5344CB8AC3E}">
-        <p14:creationId xmlns:p14="http://schemas.microsoft.com/office/powerpoint/2010/main" val="1115388553"/>
+        <p14:creationId xmlns:p14="http://schemas.microsoft.com/office/powerpoint/2010/main" val="362400055"/>
       </p:ext>
     </p:extLst>
   </p:cSld>
@@ -8762,7 +8732,7 @@
           <p:cNvPr id="2" name="Title 1">
             <a:extLst>
               <a:ext uri="{FF2B5EF4-FFF2-40B4-BE49-F238E27FC236}">
-                <a16:creationId xmlns:a16="http://schemas.microsoft.com/office/drawing/2014/main" id="{95FDF05E-7E91-8DCB-9521-F56C5C617031}"/>
+                <a16:creationId xmlns:a16="http://schemas.microsoft.com/office/drawing/2014/main" id="{5F66CF5E-735E-277C-7A5D-E2A2BE6A744F}"/>
               </a:ext>
             </a:extLst>
           </p:cNvPr>
@@ -8780,18 +8750,17 @@
           <a:p>
             <a:r>
               <a:rPr lang="ja-JP" altLang="en-US"/>
-              <a:t>全体の管理者権限について</a:t>
-            </a:r>
-            <a:endParaRPr lang="en-US"/>
-          </a:p>
-        </p:txBody>
-      </p:sp>
-      <p:sp>
-        <p:nvSpPr>
-          <p:cNvPr id="3" name="Text Placeholder 2">
+              <a:t>セキュリティ・コンプライアンスの対応</a:t>
+            </a:r>
+          </a:p>
+        </p:txBody>
+      </p:sp>
+      <p:sp>
+        <p:nvSpPr>
+          <p:cNvPr id="3" name="Content Placeholder 2">
             <a:extLst>
               <a:ext uri="{FF2B5EF4-FFF2-40B4-BE49-F238E27FC236}">
-                <a16:creationId xmlns:a16="http://schemas.microsoft.com/office/drawing/2014/main" id="{D9ECD74F-78D3-E13B-407B-4710350325B6}"/>
+                <a16:creationId xmlns:a16="http://schemas.microsoft.com/office/drawing/2014/main" id="{2C4D2774-7CDA-8444-B067-0CF381F153DE}"/>
               </a:ext>
             </a:extLst>
           </p:cNvPr>
@@ -8813,40 +8782,14 @@
               <a:buNone/>
             </a:pPr>
             <a:r>
-              <a:rPr lang="en-US" altLang="ja-JP" dirty="0">
-                <a:ea typeface="メイリオ"/>
-              </a:rPr>
+              <a:rPr lang="en-US"/>
               <a:t>Slack</a:t>
             </a:r>
             <a:r>
               <a:rPr lang="ja-JP" altLang="en-US">
                 <a:ea typeface="メイリオ"/>
               </a:rPr>
-              <a:t>の仕様を踏まえた管理の都合上、 「</a:t>
-            </a:r>
-            <a:r>
-              <a:rPr lang="en" altLang="ja-JP" dirty="0" err="1">
-                <a:ea typeface="メイリオ"/>
-              </a:rPr>
-              <a:t>UTokyo</a:t>
-            </a:r>
-            <a:r>
-              <a:rPr lang="en" altLang="ja-JP" dirty="0">
-                <a:ea typeface="メイリオ"/>
-              </a:rPr>
-              <a:t> Slack Primary Owner</a:t>
-            </a:r>
-            <a:r>
-              <a:rPr lang="ja-JP" altLang="en">
-                <a:ea typeface="メイリオ"/>
-              </a:rPr>
-              <a:t>」</a:t>
-            </a:r>
-            <a:r>
-              <a:rPr lang="ja-JP" altLang="en-US">
-                <a:ea typeface="メイリオ"/>
-              </a:rPr>
-              <a:t>という管理用の特別なアカウントが各ワークスペースに参加した状態となっています。</a:t>
+              <a:t>でのセキュリティ事案・コンプライアンス事案も他の情報サービスと同じ対応をします。</a:t>
             </a:r>
             <a:endParaRPr lang="en-US" altLang="ja-JP">
               <a:ea typeface="メイリオ"/>
@@ -8854,16 +8797,64 @@
           </a:p>
           <a:p>
             <a:r>
+              <a:rPr lang="en-US" altLang="ja-JP" err="1">
+                <a:ea typeface="メイリオ"/>
+              </a:rPr>
+              <a:t>学内の諸規則に則り、事案の当事者</a:t>
+            </a:r>
+            <a:r>
               <a:rPr lang="ja-JP" altLang="en-US">
                 <a:ea typeface="メイリオ"/>
               </a:rPr>
-              <a:t>このアカウントを用いて、</a:t>
-            </a:r>
+              <a:t>本人</a:t>
+            </a:r>
+            <a:r>
+              <a:rPr lang="en-US" altLang="ja-JP" err="1">
+                <a:ea typeface="メイリオ"/>
+              </a:rPr>
+              <a:t>に対して対応</a:t>
+            </a:r>
+            <a:r>
+              <a:rPr lang="ja-JP" altLang="en-US">
+                <a:ea typeface="メイリオ"/>
+              </a:rPr>
+              <a:t>が</a:t>
+            </a:r>
+            <a:r>
+              <a:rPr lang="en-US" altLang="ja-JP">
+                <a:ea typeface="メイリオ"/>
+              </a:rPr>
+              <a:t>行</a:t>
+            </a:r>
+            <a:r>
+              <a:rPr lang="ja-JP" altLang="en-US">
+                <a:ea typeface="メイリオ"/>
+              </a:rPr>
+              <a:t>われ</a:t>
+            </a:r>
+            <a:r>
+              <a:rPr lang="en-US" altLang="ja-JP" err="1">
+                <a:ea typeface="メイリオ"/>
+              </a:rPr>
+              <a:t>ます</a:t>
+            </a:r>
+            <a:r>
+              <a:rPr lang="en-US" altLang="ja-JP">
+                <a:ea typeface="メイリオ"/>
+              </a:rPr>
+              <a:t>。</a:t>
+            </a:r>
+            <a:endParaRPr lang="en-US" altLang="ja-JP">
+              <a:ea typeface="メイリオ"/>
+              <a:cs typeface="Calibri"/>
+            </a:endParaRPr>
+          </a:p>
+          <a:p>
             <a:r>
               <a:rPr lang="ja-JP" altLang="en-US" b="1">
                 <a:ea typeface="メイリオ"/>
               </a:rPr>
-              <a:t>メッセージ等のワークスペース内の情報を取得したり、ワークスペース内で何か操作を行ったりすることはありません。</a:t>
+              <a:t>ワークスペースの責任者（作成を申請した教職員）は、必要に応じて対応へのご協力をお願いします。</a:t>
             </a:r>
             <a:endParaRPr lang="en-US" altLang="ja-JP" b="1">
               <a:ea typeface="メイリオ"/>
@@ -8872,29 +8863,109 @@
           <a:p>
             <a:pPr lvl="1"/>
             <a:r>
-              <a:rPr lang="ja-JP" altLang="en-US"/>
-              <a:t>ただし、管理上特にやむを得ない必要がある場合（セキュリティ・コンプライアンス上の対応を適正な学内手続きに則って行う場合・ワークスペースの責任者が不在となった場合など）や、ワークスペースの責任者からの申請に基づく操作を行う場合を除きます。</a:t>
-            </a:r>
-            <a:endParaRPr lang="en-US" altLang="ja-JP"/>
-          </a:p>
-          <a:p>
-            <a:r>
-              <a:rPr lang="en" altLang="ja-JP" dirty="0">
-                <a:ea typeface="メイリオ"/>
-              </a:rPr>
-              <a:t>Slack</a:t>
-            </a:r>
-            <a:r>
               <a:rPr lang="ja-JP" altLang="en-US">
                 <a:ea typeface="メイリオ"/>
               </a:rPr>
-              <a:t>管理専用のアカウントとなっており、担当者が普段用いるアカウントとは区別されています。</a:t>
+              <a:t>事案が発生した場合の適切な窓口（部局</a:t>
+            </a:r>
+            <a:r>
+              <a:rPr lang="en-US" altLang="ja-JP">
+                <a:ea typeface="メイリオ"/>
+              </a:rPr>
+              <a:t>CISO</a:t>
+            </a:r>
+            <a:r>
+              <a:rPr lang="ja-JP" altLang="en-US">
+                <a:ea typeface="メイリオ"/>
+              </a:rPr>
+              <a:t>・部局</a:t>
+            </a:r>
+            <a:r>
+              <a:rPr lang="en-US" altLang="ja-JP">
+                <a:ea typeface="メイリオ"/>
+              </a:rPr>
+              <a:t>CERT</a:t>
+            </a:r>
+            <a:r>
+              <a:rPr lang="ja-JP" altLang="en-US">
+                <a:ea typeface="メイリオ"/>
+              </a:rPr>
+              <a:t>等）への報告</a:t>
             </a:r>
             <a:endParaRPr lang="en-US" altLang="ja-JP">
               <a:ea typeface="メイリオ"/>
             </a:endParaRPr>
           </a:p>
           <a:p>
+            <a:pPr lvl="1"/>
+            <a:r>
+              <a:rPr lang="ja-JP" altLang="en-US"/>
+              <a:t>調査への協力　など</a:t>
+            </a:r>
+          </a:p>
+          <a:p>
+            <a:r>
+              <a:rPr lang="ja-JP" altLang="en-US">
+                <a:ea typeface="メイリオ"/>
+              </a:rPr>
+              <a:t>諸規則に基づいて</a:t>
+            </a:r>
+            <a:r>
+              <a:rPr lang="en-US" altLang="ja-JP">
+                <a:ea typeface="メイリオ"/>
+              </a:rPr>
+              <a:t>CISO</a:t>
+            </a:r>
+            <a:r>
+              <a:rPr lang="ja-JP" altLang="en-US">
+                <a:ea typeface="メイリオ"/>
+              </a:rPr>
+              <a:t>が決定した処置・</a:t>
+            </a:r>
+            <a:r>
+              <a:rPr lang="en-US" altLang="ja-JP">
+                <a:ea typeface="メイリオ"/>
+              </a:rPr>
+              <a:t>CERT</a:t>
+            </a:r>
+            <a:r>
+              <a:rPr lang="ja-JP" altLang="en-US">
+                <a:ea typeface="メイリオ"/>
+              </a:rPr>
+              <a:t>の行う緊急対応などに対しては、サービス責任者（情報システム本部長）の判断のもと、必要な対応を行います。</a:t>
+            </a:r>
+            <a:endParaRPr lang="en-US" altLang="ja-JP">
+              <a:ea typeface="メイリオ"/>
+            </a:endParaRPr>
+          </a:p>
+        </p:txBody>
+      </p:sp>
+      <p:sp>
+        <p:nvSpPr>
+          <p:cNvPr id="4" name="Slide Number Placeholder 3">
+            <a:extLst>
+              <a:ext uri="{FF2B5EF4-FFF2-40B4-BE49-F238E27FC236}">
+                <a16:creationId xmlns:a16="http://schemas.microsoft.com/office/drawing/2014/main" id="{45B2B187-903F-A39D-8D11-12A940036F49}"/>
+              </a:ext>
+            </a:extLst>
+          </p:cNvPr>
+          <p:cNvSpPr>
+            <a:spLocks noGrp="1"/>
+          </p:cNvSpPr>
+          <p:nvPr>
+            <p:ph type="sldNum" sz="quarter" idx="12"/>
+          </p:nvPr>
+        </p:nvSpPr>
+        <p:spPr/>
+        <p:txBody>
+          <a:bodyPr/>
+          <a:lstStyle/>
+          <a:p>
+            <a:fld id="{7132C4A5-202B-4DA4-9DB0-0994E867E2A1}" type="slidenum">
+              <a:rPr lang="ja-JP" altLang="en-US" smtClean="0"/>
+              <a:pPr/>
+              <a:t>20</a:t>
+            </a:fld>
             <a:endParaRPr lang="ja-JP" altLang="en-US"/>
           </a:p>
         </p:txBody>
@@ -8902,7 +8973,7 @@
     </p:spTree>
     <p:extLst>
       <p:ext uri="{BB962C8B-B14F-4D97-AF65-F5344CB8AC3E}">
-        <p14:creationId xmlns:p14="http://schemas.microsoft.com/office/powerpoint/2010/main" val="3657429152"/>
+        <p14:creationId xmlns:p14="http://schemas.microsoft.com/office/powerpoint/2010/main" val="1115388553"/>
       </p:ext>
     </p:extLst>
   </p:cSld>
@@ -8931,6 +9002,330 @@
       </p:grpSpPr>
       <p:sp>
         <p:nvSpPr>
+          <p:cNvPr id="2" name="Title 1">
+            <a:extLst>
+              <a:ext uri="{FF2B5EF4-FFF2-40B4-BE49-F238E27FC236}">
+                <a16:creationId xmlns:a16="http://schemas.microsoft.com/office/drawing/2014/main" id="{95FDF05E-7E91-8DCB-9521-F56C5C617031}"/>
+              </a:ext>
+            </a:extLst>
+          </p:cNvPr>
+          <p:cNvSpPr>
+            <a:spLocks noGrp="1"/>
+          </p:cNvSpPr>
+          <p:nvPr>
+            <p:ph type="title"/>
+          </p:nvPr>
+        </p:nvSpPr>
+        <p:spPr/>
+        <p:txBody>
+          <a:bodyPr/>
+          <a:lstStyle/>
+          <a:p>
+            <a:r>
+              <a:rPr lang="ja-JP" altLang="en-US"/>
+              <a:t>全体の管理者権限について</a:t>
+            </a:r>
+            <a:endParaRPr lang="en-US"/>
+          </a:p>
+        </p:txBody>
+      </p:sp>
+      <p:sp>
+        <p:nvSpPr>
+          <p:cNvPr id="3" name="Text Placeholder 2">
+            <a:extLst>
+              <a:ext uri="{FF2B5EF4-FFF2-40B4-BE49-F238E27FC236}">
+                <a16:creationId xmlns:a16="http://schemas.microsoft.com/office/drawing/2014/main" id="{D9ECD74F-78D3-E13B-407B-4710350325B6}"/>
+              </a:ext>
+            </a:extLst>
+          </p:cNvPr>
+          <p:cNvSpPr>
+            <a:spLocks noGrp="1"/>
+          </p:cNvSpPr>
+          <p:nvPr>
+            <p:ph idx="1"/>
+          </p:nvPr>
+        </p:nvSpPr>
+        <p:spPr/>
+        <p:txBody>
+          <a:bodyPr vert="horz" lIns="91440" tIns="45720" rIns="91440" bIns="45720" rtlCol="0" anchor="t">
+            <a:normAutofit/>
+          </a:bodyPr>
+          <a:lstStyle/>
+          <a:p>
+            <a:pPr marL="0" indent="0">
+              <a:buNone/>
+            </a:pPr>
+            <a:r>
+              <a:rPr lang="en-US" altLang="ja-JP">
+                <a:ea typeface="メイリオ"/>
+              </a:rPr>
+              <a:t>Slack</a:t>
+            </a:r>
+            <a:r>
+              <a:rPr lang="ja-JP" altLang="en-US">
+                <a:ea typeface="メイリオ"/>
+              </a:rPr>
+              <a:t>の仕様を踏まえた管理の都合上、 「</a:t>
+            </a:r>
+            <a:r>
+              <a:rPr lang="en" altLang="ja-JP" err="1">
+                <a:ea typeface="メイリオ"/>
+              </a:rPr>
+              <a:t>UTokyo</a:t>
+            </a:r>
+            <a:r>
+              <a:rPr lang="en" altLang="ja-JP">
+                <a:ea typeface="メイリオ"/>
+              </a:rPr>
+              <a:t> Slack Primary Owner</a:t>
+            </a:r>
+            <a:r>
+              <a:rPr lang="ja-JP" altLang="en">
+                <a:ea typeface="メイリオ"/>
+              </a:rPr>
+              <a:t>」</a:t>
+            </a:r>
+            <a:r>
+              <a:rPr lang="ja-JP" altLang="en-US">
+                <a:ea typeface="メイリオ"/>
+              </a:rPr>
+              <a:t>という管理用の特別なアカウントが各ワークスペースに参加した状態となっています。</a:t>
+            </a:r>
+            <a:endParaRPr lang="en-US" altLang="ja-JP">
+              <a:ea typeface="メイリオ"/>
+            </a:endParaRPr>
+          </a:p>
+          <a:p>
+            <a:r>
+              <a:rPr lang="ja-JP" altLang="en-US">
+                <a:ea typeface="メイリオ"/>
+              </a:rPr>
+              <a:t>このアカウントを用いて、</a:t>
+            </a:r>
+            <a:r>
+              <a:rPr lang="ja-JP" altLang="en-US" b="1">
+                <a:ea typeface="メイリオ"/>
+              </a:rPr>
+              <a:t>メッセージ等のワークスペース内の情報を取得したり、ワークスペース内で何か操作を行ったりすることはありません。</a:t>
+            </a:r>
+            <a:endParaRPr lang="en-US" altLang="ja-JP" b="1">
+              <a:ea typeface="メイリオ"/>
+            </a:endParaRPr>
+          </a:p>
+          <a:p>
+            <a:pPr lvl="1"/>
+            <a:r>
+              <a:rPr lang="ja-JP" altLang="en-US"/>
+              <a:t>ただし、管理上特にやむを得ない必要がある場合（セキュリティ・コンプライアンス上の対応を適正な学内手続きに則って行う場合・ワークスペースの責任者が不在となった場合など）や、ワークスペースの責任者からの申請に基づく操作を行う場合を除きます。</a:t>
+            </a:r>
+            <a:endParaRPr lang="en-US" altLang="ja-JP"/>
+          </a:p>
+          <a:p>
+            <a:r>
+              <a:rPr lang="en" altLang="ja-JP">
+                <a:ea typeface="メイリオ"/>
+              </a:rPr>
+              <a:t>Slack</a:t>
+            </a:r>
+            <a:r>
+              <a:rPr lang="ja-JP" altLang="en-US">
+                <a:ea typeface="メイリオ"/>
+              </a:rPr>
+              <a:t>管理専用のアカウントとなっており、担当者が普段用いるアカウントとは区別されています。</a:t>
+            </a:r>
+            <a:endParaRPr lang="en-US" altLang="ja-JP">
+              <a:ea typeface="メイリオ"/>
+            </a:endParaRPr>
+          </a:p>
+          <a:p>
+            <a:endParaRPr lang="ja-JP" altLang="en-US"/>
+          </a:p>
+        </p:txBody>
+      </p:sp>
+    </p:spTree>
+    <p:extLst>
+      <p:ext uri="{BB962C8B-B14F-4D97-AF65-F5344CB8AC3E}">
+        <p14:creationId xmlns:p14="http://schemas.microsoft.com/office/powerpoint/2010/main" val="3657429152"/>
+      </p:ext>
+    </p:extLst>
+  </p:cSld>
+  <p:clrMapOvr>
+    <a:masterClrMapping/>
+  </p:clrMapOvr>
+</p:sld>
+</file>
+
+<file path=ppt/slides/slide22.xml><?xml version="1.0" encoding="utf-8"?>
+<p:sld xmlns:a="http://schemas.openxmlformats.org/drawingml/2006/main" xmlns:r="http://schemas.openxmlformats.org/officeDocument/2006/relationships" xmlns:p="http://schemas.openxmlformats.org/presentationml/2006/main">
+  <p:cSld>
+    <p:spTree>
+      <p:nvGrpSpPr>
+        <p:cNvPr id="1" name=""/>
+        <p:cNvGrpSpPr/>
+        <p:nvPr/>
+      </p:nvGrpSpPr>
+      <p:grpSpPr>
+        <a:xfrm>
+          <a:off x="0" y="0"/>
+          <a:ext cx="0" cy="0"/>
+          <a:chOff x="0" y="0"/>
+          <a:chExt cx="0" cy="0"/>
+        </a:xfrm>
+      </p:grpSpPr>
+      <p:sp>
+        <p:nvSpPr>
+          <p:cNvPr id="2" name="タイトル 1">
+            <a:extLst>
+              <a:ext uri="{FF2B5EF4-FFF2-40B4-BE49-F238E27FC236}">
+                <a16:creationId xmlns:a16="http://schemas.microsoft.com/office/drawing/2014/main" id="{210BE99F-0F52-2F07-1DB9-B1D701253D90}"/>
+              </a:ext>
+            </a:extLst>
+          </p:cNvPr>
+          <p:cNvSpPr>
+            <a:spLocks noGrp="1"/>
+          </p:cNvSpPr>
+          <p:nvPr>
+            <p:ph type="title"/>
+          </p:nvPr>
+        </p:nvSpPr>
+        <p:spPr/>
+        <p:txBody>
+          <a:bodyPr/>
+          <a:lstStyle/>
+          <a:p>
+            <a:r>
+              <a:rPr kumimoji="1" lang="ja-JP" altLang="en-US"/>
+              <a:t>カスタム絵文字の追加</a:t>
+            </a:r>
+          </a:p>
+        </p:txBody>
+      </p:sp>
+      <p:sp>
+        <p:nvSpPr>
+          <p:cNvPr id="3" name="コンテンツ プレースホルダー 2">
+            <a:extLst>
+              <a:ext uri="{FF2B5EF4-FFF2-40B4-BE49-F238E27FC236}">
+                <a16:creationId xmlns:a16="http://schemas.microsoft.com/office/drawing/2014/main" id="{64A45F0D-398F-E01C-DBCD-4839CBE80CD9}"/>
+              </a:ext>
+            </a:extLst>
+          </p:cNvPr>
+          <p:cNvSpPr>
+            <a:spLocks noGrp="1"/>
+          </p:cNvSpPr>
+          <p:nvPr>
+            <p:ph idx="1"/>
+          </p:nvPr>
+        </p:nvSpPr>
+        <p:spPr/>
+        <p:txBody>
+          <a:bodyPr/>
+          <a:lstStyle/>
+          <a:p>
+            <a:r>
+              <a:rPr kumimoji="1" lang="ja-JP" altLang="en-US"/>
+              <a:t>前提として、カスタム絵文字は</a:t>
+            </a:r>
+            <a:r>
+              <a:rPr kumimoji="1" lang="en-US" altLang="ja-JP" err="1"/>
+              <a:t>UTokyo</a:t>
+            </a:r>
+            <a:r>
+              <a:rPr kumimoji="1" lang="en-US" altLang="ja-JP"/>
+              <a:t> Slack</a:t>
+            </a:r>
+            <a:r>
+              <a:rPr kumimoji="1" lang="ja-JP" altLang="en-US"/>
+              <a:t>全体にしか追加できません。</a:t>
+            </a:r>
+            <a:endParaRPr kumimoji="1" lang="en-US" altLang="ja-JP"/>
+          </a:p>
+          <a:p>
+            <a:pPr lvl="1"/>
+            <a:r>
+              <a:rPr kumimoji="1" lang="ja-JP" altLang="en-US"/>
+              <a:t>特定のワークスペースだけに追加することはできません。</a:t>
+            </a:r>
+            <a:endParaRPr kumimoji="1" lang="en-US" altLang="ja-JP"/>
+          </a:p>
+          <a:p>
+            <a:pPr lvl="1"/>
+            <a:r>
+              <a:rPr kumimoji="1" lang="ja-JP" altLang="en-US"/>
+              <a:t>残念ながら、</a:t>
+            </a:r>
+            <a:r>
+              <a:rPr kumimoji="1" lang="en-US" altLang="ja-JP"/>
+              <a:t>Enterprise Grid</a:t>
+            </a:r>
+            <a:r>
+              <a:rPr kumimoji="1" lang="ja-JP" altLang="en-US"/>
+              <a:t>プランの仕様がこのような形になっています。</a:t>
+            </a:r>
+            <a:endParaRPr kumimoji="1" lang="en-US" altLang="ja-JP"/>
+          </a:p>
+          <a:p>
+            <a:r>
+              <a:rPr kumimoji="1" lang="ja-JP" altLang="en-US"/>
+              <a:t>ワークスペースのオーナー・管理者の権限をお持ちの方が追加できます。</a:t>
+            </a:r>
+            <a:endParaRPr kumimoji="1" lang="en-US" altLang="ja-JP"/>
+          </a:p>
+          <a:p>
+            <a:pPr lvl="1"/>
+            <a:r>
+              <a:rPr lang="ja-JP" altLang="en-US"/>
+              <a:t>各ワークスペースにて、責任者となる教職員から、適切に管理・運用いただける方に権限を付与していただくものとしています。</a:t>
+            </a:r>
+            <a:endParaRPr lang="en-US" altLang="ja-JP"/>
+          </a:p>
+          <a:p>
+            <a:r>
+              <a:rPr lang="ja-JP" altLang="en-US"/>
+              <a:t>東京大学の多様な構成員の目に触れるものであることを踏まえ、適切に利用してください。</a:t>
+            </a:r>
+            <a:endParaRPr kumimoji="1" lang="en-US" altLang="ja-JP"/>
+          </a:p>
+          <a:p>
+            <a:endParaRPr kumimoji="1" lang="en-US" altLang="ja-JP"/>
+          </a:p>
+          <a:p>
+            <a:pPr lvl="1"/>
+            <a:endParaRPr kumimoji="1" lang="ja-JP" altLang="en-US"/>
+          </a:p>
+        </p:txBody>
+      </p:sp>
+    </p:spTree>
+    <p:extLst>
+      <p:ext uri="{BB962C8B-B14F-4D97-AF65-F5344CB8AC3E}">
+        <p14:creationId xmlns:p14="http://schemas.microsoft.com/office/powerpoint/2010/main" val="1411790658"/>
+      </p:ext>
+    </p:extLst>
+  </p:cSld>
+  <p:clrMapOvr>
+    <a:masterClrMapping/>
+  </p:clrMapOvr>
+</p:sld>
+</file>
+
+<file path=ppt/slides/slide23.xml><?xml version="1.0" encoding="utf-8"?>
+<p:sld xmlns:a="http://schemas.openxmlformats.org/drawingml/2006/main" xmlns:r="http://schemas.openxmlformats.org/officeDocument/2006/relationships" xmlns:p="http://schemas.openxmlformats.org/presentationml/2006/main">
+  <p:cSld>
+    <p:spTree>
+      <p:nvGrpSpPr>
+        <p:cNvPr id="1" name=""/>
+        <p:cNvGrpSpPr/>
+        <p:nvPr/>
+      </p:nvGrpSpPr>
+      <p:grpSpPr>
+        <a:xfrm>
+          <a:off x="0" y="0"/>
+          <a:ext cx="0" cy="0"/>
+          <a:chOff x="0" y="0"/>
+          <a:chExt cx="0" cy="0"/>
+        </a:xfrm>
+      </p:grpSpPr>
+      <p:sp>
+        <p:nvSpPr>
           <p:cNvPr id="2" name="タイトル 1">
             <a:extLst>
               <a:ext uri="{FF2B5EF4-FFF2-40B4-BE49-F238E27FC236}">
@@ -8948,17 +9343,21 @@
         <p:spPr/>
         <p:txBody>
           <a:bodyPr>
-            <a:normAutofit fontScale="90000"/>
+            <a:normAutofit/>
           </a:bodyPr>
           <a:lstStyle/>
           <a:p>
             <a:r>
-              <a:rPr lang="ja-JP" altLang="en-US">
+              <a:rPr lang="en-US" altLang="ja-JP">
                 <a:ea typeface="メイリオ"/>
                 <a:cs typeface="Calibri"/>
               </a:rPr>
-              <a:t>使ってみようと思い、アクセスしましたが「これに対するアクセス権がありません」と表示されました。</a:t>
-            </a:r>
+              <a:t>Enjoy Communicating on Slack!</a:t>
+            </a:r>
+            <a:endParaRPr lang="ja-JP" altLang="en-US">
+              <a:ea typeface="メイリオ"/>
+              <a:cs typeface="Calibri"/>
+            </a:endParaRPr>
           </a:p>
         </p:txBody>
       </p:sp>
@@ -8985,94 +9384,58 @@
           </a:bodyPr>
           <a:lstStyle/>
           <a:p>
-            <a:r>
-              <a:rPr lang="en-US" altLang="ja-JP" dirty="0" err="1">
+            <a:pPr marL="0" indent="0">
+              <a:buNone/>
+            </a:pPr>
+            <a:r>
+              <a:rPr lang="en-US" altLang="ja-JP" b="1" err="1">
                 <a:ea typeface="メイリオ"/>
                 <a:cs typeface="Calibri"/>
               </a:rPr>
-              <a:t>UTokyo</a:t>
-            </a:r>
-            <a:r>
-              <a:rPr lang="en-US" altLang="ja-JP" dirty="0">
+              <a:t>ぜひ活用いただき、成果を共有してください</a:t>
+            </a:r>
+            <a:r>
+              <a:rPr lang="en-US" altLang="ja-JP" b="1">
                 <a:ea typeface="メイリオ"/>
                 <a:cs typeface="Calibri"/>
               </a:rPr>
-              <a:t> Account </a:t>
-            </a:r>
-            <a:r>
-              <a:rPr lang="en-US" altLang="ja-JP" dirty="0" err="1">
+              <a:t>。</a:t>
+            </a:r>
+          </a:p>
+          <a:p>
+            <a:pPr marL="0" indent="0">
+              <a:buNone/>
+            </a:pPr>
+            <a:r>
+              <a:rPr lang="en-US" altLang="ja-JP" b="1" err="1">
                 <a:ea typeface="メイリオ"/>
                 <a:cs typeface="Calibri"/>
               </a:rPr>
-              <a:t>の多要素認証の設定ができていません</a:t>
-            </a:r>
-            <a:r>
-              <a:rPr lang="en-US" altLang="ja-JP" dirty="0">
+              <a:t>また</a:t>
+            </a:r>
+            <a:r>
+              <a:rPr lang="en-US" altLang="ja-JP" b="1">
                 <a:ea typeface="メイリオ"/>
                 <a:cs typeface="Calibri"/>
               </a:rPr>
-              <a:t>。</a:t>
-            </a:r>
-          </a:p>
-          <a:p>
-            <a:endParaRPr lang="en-US" altLang="ja-JP" dirty="0">
-              <a:ea typeface="メイリオ"/>
-              <a:cs typeface="Calibri"/>
-            </a:endParaRPr>
-          </a:p>
-          <a:p>
-            <a:endParaRPr lang="en-US" altLang="ja-JP" dirty="0">
-              <a:ea typeface="メイリオ"/>
-              <a:cs typeface="Calibri"/>
-            </a:endParaRPr>
-          </a:p>
-          <a:p>
-            <a:endParaRPr lang="en-US" altLang="ja-JP" dirty="0">
-              <a:ea typeface="メイリオ"/>
-              <a:cs typeface="Calibri"/>
-            </a:endParaRPr>
-          </a:p>
-          <a:p>
-            <a:pPr marL="0" indent="0">
-              <a:buNone/>
-            </a:pPr>
-            <a:endParaRPr lang="en-US" altLang="ja-JP" b="1" dirty="0">
-              <a:ea typeface="メイリオ"/>
-              <a:cs typeface="Calibri"/>
-            </a:endParaRPr>
-          </a:p>
-          <a:p>
-            <a:pPr marL="0" indent="0">
-              <a:buNone/>
-            </a:pPr>
-            <a:r>
-              <a:rPr lang="en-US" altLang="ja-JP" b="1" dirty="0" err="1">
+              <a:t>、</a:t>
+            </a:r>
+            <a:r>
+              <a:rPr lang="ja-JP" altLang="en-US" b="1">
                 <a:ea typeface="メイリオ"/>
                 <a:cs typeface="Calibri"/>
               </a:rPr>
-              <a:t>ぜひ活用いただき、成果を共有してください</a:t>
-            </a:r>
-            <a:r>
-              <a:rPr lang="en-US" altLang="ja-JP" b="1" dirty="0">
+              <a:t>機能の要望などフィードバックに</a:t>
+            </a:r>
+            <a:r>
+              <a:rPr lang="en-US" altLang="ja-JP" b="1" err="1">
                 <a:ea typeface="メイリオ"/>
                 <a:cs typeface="Calibri"/>
               </a:rPr>
-              <a:t>。</a:t>
-            </a:r>
-          </a:p>
-          <a:p>
-            <a:pPr marL="0" indent="0">
-              <a:buNone/>
-            </a:pPr>
-            <a:r>
-              <a:rPr lang="en-US" altLang="ja-JP" b="1" dirty="0" err="1">
-                <a:ea typeface="メイリオ"/>
-                <a:cs typeface="Calibri"/>
-              </a:rPr>
-              <a:t>また、本運用に向けて準備を進めますのでご協力お願いします</a:t>
-            </a:r>
-            <a:r>
-              <a:rPr lang="en-US" altLang="ja-JP" b="1" dirty="0">
+              <a:t>ご協力お願いします</a:t>
+            </a:r>
+            <a:r>
+              <a:rPr lang="en-US" altLang="ja-JP" b="1">
                 <a:ea typeface="メイリオ"/>
                 <a:cs typeface="Calibri"/>
               </a:rPr>
@@ -10014,13 +10377,13 @@
               <a:t>「</a:t>
             </a:r>
             <a:r>
-              <a:rPr lang="en-US" altLang="ja-JP" dirty="0" err="1">
+              <a:rPr lang="en-US" altLang="ja-JP" err="1">
                 <a:ea typeface="メイリオ"/>
               </a:rPr>
               <a:t>UTokyo</a:t>
             </a:r>
             <a:r>
-              <a:rPr lang="en-US" altLang="ja-JP" dirty="0">
+              <a:rPr lang="en-US" altLang="ja-JP">
                 <a:ea typeface="メイリオ"/>
               </a:rPr>
               <a:t> Slack</a:t>
@@ -10032,7 +10395,7 @@
               <a:t>」として</a:t>
             </a:r>
             <a:r>
-              <a:rPr lang="en-US" altLang="ja-JP" b="1" dirty="0">
+              <a:rPr lang="en-US" altLang="ja-JP" b="1">
                 <a:ea typeface="メイリオ"/>
               </a:rPr>
               <a:t>Slack</a:t>
@@ -10061,13 +10424,13 @@
               <a:t>利用対象者は</a:t>
             </a:r>
             <a:r>
-              <a:rPr lang="en-US" altLang="ja-JP" dirty="0" err="1">
+              <a:rPr lang="en-US" altLang="ja-JP" err="1">
                 <a:ea typeface="メイリオ"/>
               </a:rPr>
               <a:t>UTokyo</a:t>
             </a:r>
             <a:r>
-              <a:rPr lang="en-US" altLang="ja-JP" dirty="0">
+              <a:rPr lang="en-US" altLang="ja-JP">
                 <a:ea typeface="メイリオ"/>
               </a:rPr>
               <a:t> Account</a:t>
@@ -10086,14 +10449,14 @@
           <a:p>
             <a:pPr lvl="1"/>
             <a:r>
-              <a:rPr lang="en-US" altLang="ja-JP" b="1" dirty="0">
+              <a:rPr lang="en-US" altLang="ja-JP" b="1">
                 <a:ea typeface="メイリオ"/>
                 <a:hlinkClick r:id="rId2"/>
               </a:rPr>
               <a:t>UTokyo Account</a:t>
             </a:r>
             <a:r>
-              <a:rPr lang="ja-JP" altLang="en-US" b="1" dirty="0">
+              <a:rPr lang="ja-JP" altLang="en-US" b="1">
                 <a:ea typeface="メイリオ"/>
                 <a:hlinkClick r:id="rId2"/>
               </a:rPr>
@@ -10112,7 +10475,7 @@
               <a:t>です。また、</a:t>
             </a:r>
             <a:r>
-              <a:rPr lang="ja-JP" altLang="en-US" dirty="0">
+              <a:rPr lang="ja-JP" altLang="en-US">
                 <a:ea typeface="メイリオ"/>
                 <a:hlinkClick r:id="rId3"/>
               </a:rPr>
@@ -10135,7 +10498,18 @@
               <a:rPr lang="ja-JP" altLang="en-US">
                 <a:ea typeface="メイリオ"/>
               </a:rPr>
-              <a:t>学外の方と一緒に利用する方法も学内コミュニケーションとは少し異なりますがあります。（後述の「コネクト」機能）</a:t>
+              <a:t>学外の方と一緒に利用したい場合は工夫が必要ですが、方法は案内しています。</a:t>
+            </a:r>
+            <a:br>
+              <a:rPr lang="en-US" altLang="ja-JP">
+                <a:ea typeface="メイリオ"/>
+              </a:rPr>
+            </a:br>
+            <a:r>
+              <a:rPr lang="ja-JP" altLang="en-US">
+                <a:ea typeface="メイリオ"/>
+              </a:rPr>
+              <a:t>（後述の「コネクト」機能）</a:t>
             </a:r>
             <a:endParaRPr lang="ja-JP" altLang="en-US">
               <a:ea typeface="メイリオ"/>
@@ -10150,13 +10524,26 @@
               <a:t>利用方法など詳細はすべてこちら→</a:t>
             </a:r>
             <a:r>
-              <a:rPr lang="en-US" altLang="ja-JP" b="1" dirty="0">
+              <a:rPr lang="en-US" altLang="ja-JP" b="1">
                 <a:ea typeface="メイリオ"/>
                 <a:hlinkClick r:id="rId4"/>
               </a:rPr>
               <a:t>https://utelecon.adm.u-tokyo.ac.jp/slack/</a:t>
             </a:r>
             <a:endParaRPr lang="en-US" altLang="ja-JP" b="1">
+              <a:ea typeface="メイリオ"/>
+            </a:endParaRPr>
+          </a:p>
+          <a:p>
+            <a:pPr lvl="1"/>
+            <a:r>
+              <a:rPr lang="ja-JP" altLang="en-US">
+                <a:ea typeface="メイリオ"/>
+                <a:cs typeface="Calibri" panose="020F0502020204030204"/>
+              </a:rPr>
+              <a:t>分からないことがある場合は、まずご自身でこちらを確認してみてください。</a:t>
+            </a:r>
+            <a:endParaRPr lang="en-US" altLang="ja-JP">
               <a:ea typeface="メイリオ" panose="020B0604030504040204" pitchFamily="34" charset="-128"/>
               <a:cs typeface="Calibri" panose="020F0502020204030204"/>
             </a:endParaRPr>
@@ -10326,7 +10713,7 @@
               <a:buNone/>
             </a:pPr>
             <a:r>
-              <a:rPr lang="en-US" altLang="ja-JP" dirty="0">
+              <a:rPr lang="en-US" altLang="ja-JP">
                 <a:ea typeface="メイリオ"/>
               </a:rPr>
               <a:t>Slack</a:t>
@@ -10338,7 +10725,7 @@
               <a:t>の「</a:t>
             </a:r>
             <a:r>
-              <a:rPr lang="en-US" altLang="ja-JP" dirty="0">
+              <a:rPr lang="en-US" altLang="ja-JP">
                 <a:ea typeface="メイリオ"/>
               </a:rPr>
               <a:t>Enterprise Grid</a:t>
@@ -10393,13 +10780,13 @@
               <a:t>プロフィール・カスタム絵文字などが</a:t>
             </a:r>
             <a:r>
-              <a:rPr lang="en-US" altLang="ja-JP" dirty="0" err="1">
+              <a:rPr lang="en-US" altLang="ja-JP" err="1">
                 <a:ea typeface="メイリオ"/>
               </a:rPr>
               <a:t>UTokyo</a:t>
             </a:r>
             <a:r>
-              <a:rPr lang="en-US" altLang="ja-JP" dirty="0">
+              <a:rPr lang="en-US" altLang="ja-JP">
                 <a:ea typeface="メイリオ"/>
               </a:rPr>
               <a:t> Slack</a:t>
@@ -10408,7 +10795,7 @@
               <a:rPr lang="ja-JP" altLang="en-US">
                 <a:ea typeface="メイリオ"/>
               </a:rPr>
-              <a:t>全体で共通であるなど</a:t>
+              <a:t>全体で共通である、等</a:t>
             </a:r>
             <a:endParaRPr lang="ja-JP" altLang="en-US">
               <a:ea typeface="メイリオ"/>
@@ -10822,7 +11209,44 @@
             </a:pPr>
             <a:r>
               <a:rPr kumimoji="1" lang="ja-JP" altLang="en-US"/>
-              <a:t>資料・録画ともに提供中です</a:t>
+              <a:t>資料・録画ともに提供中です。</a:t>
+            </a:r>
+            <a:endParaRPr kumimoji="1" lang="en-US" altLang="ja-JP"/>
+          </a:p>
+          <a:p>
+            <a:pPr marL="0" indent="0">
+              <a:buNone/>
+            </a:pPr>
+            <a:r>
+              <a:rPr kumimoji="1" lang="en-US" altLang="ja-JP"/>
+              <a:t>9</a:t>
+            </a:r>
+            <a:r>
+              <a:rPr kumimoji="1" lang="ja-JP" altLang="en-US"/>
+              <a:t>月</a:t>
+            </a:r>
+            <a:r>
+              <a:rPr kumimoji="1" lang="en-US" altLang="ja-JP"/>
+              <a:t>13</a:t>
+            </a:r>
+            <a:r>
+              <a:rPr kumimoji="1" lang="ja-JP" altLang="en-US"/>
+              <a:t>日にパート</a:t>
+            </a:r>
+            <a:r>
+              <a:rPr kumimoji="1" lang="en-US" altLang="ja-JP"/>
+              <a:t>1</a:t>
+            </a:r>
+            <a:r>
+              <a:rPr kumimoji="1" lang="ja-JP" altLang="en-US"/>
+              <a:t>質疑応答のまとめを掲載しました。</a:t>
+            </a:r>
+            <a:br>
+              <a:rPr kumimoji="1" lang="en-US" altLang="ja-JP"/>
+            </a:br>
+            <a:r>
+              <a:rPr kumimoji="1" lang="ja-JP" altLang="en-US"/>
+              <a:t>（対応が大幅に遅れ申し訳ありませんでした🙇）</a:t>
             </a:r>
             <a:endParaRPr kumimoji="1" lang="en-US" altLang="ja-JP"/>
           </a:p>
@@ -11758,10 +12182,10 @@
               <a:rPr lang="ja-JP" altLang="en-US">
                 <a:ea typeface="メイリオ"/>
               </a:rPr>
-              <a:t>誰でも利用できるパブリックなワークスペースを</a:t>
-            </a:r>
-            <a:r>
-              <a:rPr lang="en-US" altLang="ja-JP" dirty="0">
+              <a:t>誰でも利用できるオープンなワークスペースを</a:t>
+            </a:r>
+            <a:r>
+              <a:rPr lang="en-US" altLang="ja-JP">
                 <a:ea typeface="メイリオ"/>
               </a:rPr>
               <a:t>2</a:t>
@@ -11778,13 +12202,13 @@
           </a:p>
           <a:p>
             <a:r>
-              <a:rPr lang="en-US" altLang="ja-JP" b="1" dirty="0" err="1">
+              <a:rPr lang="en-US" altLang="ja-JP" b="1" err="1">
                 <a:ea typeface="メイリオ"/>
               </a:rPr>
               <a:t>UTokyo</a:t>
             </a:r>
             <a:r>
-              <a:rPr lang="en-US" altLang="ja-JP" b="1" dirty="0">
+              <a:rPr lang="en-US" altLang="ja-JP" b="1">
                 <a:ea typeface="メイリオ"/>
               </a:rPr>
               <a:t> </a:t>
@@ -11811,7 +12235,7 @@
           <a:p>
             <a:pPr lvl="1"/>
             <a:r>
-              <a:rPr lang="en" altLang="ja-JP" dirty="0">
+              <a:rPr lang="en" altLang="ja-JP">
                 <a:ea typeface="メイリオ"/>
               </a:rPr>
               <a:t>Slack</a:t>
@@ -11828,11 +12252,11 @@
           </a:p>
           <a:p>
             <a:r>
-              <a:rPr lang="en-US" b="1" dirty="0" err="1"/>
+              <a:rPr lang="en-US" b="1" err="1"/>
               <a:t>UTokyo</a:t>
             </a:r>
             <a:r>
-              <a:rPr lang="en-US" b="1" dirty="0"/>
+              <a:rPr lang="en-US" b="1"/>
               <a:t> Slack </a:t>
             </a:r>
             <a:r>
@@ -11858,13 +12282,13 @@
               <a:buNone/>
             </a:pPr>
             <a:r>
-              <a:rPr lang="en-US" altLang="ja-JP" dirty="0" err="1">
+              <a:rPr lang="en-US" altLang="ja-JP" err="1">
                 <a:ea typeface="メイリオ"/>
               </a:rPr>
               <a:t>UTokyo</a:t>
             </a:r>
             <a:r>
-              <a:rPr lang="en-US" altLang="ja-JP" dirty="0">
+              <a:rPr lang="en-US" altLang="ja-JP">
                 <a:ea typeface="メイリオ"/>
               </a:rPr>
               <a:t> Account</a:t>
@@ -11876,17 +12300,17 @@
               <a:t>の多要素認証の有効化を済ませていれば、</a:t>
             </a:r>
             <a:br>
-              <a:rPr lang="en-US" altLang="ja-JP" dirty="0"/>
+              <a:rPr lang="en-US" altLang="ja-JP"/>
             </a:br>
             <a:r>
-              <a:rPr lang="en-US" altLang="ja-JP" dirty="0">
+              <a:rPr lang="en-US" altLang="ja-JP">
                 <a:ea typeface="メイリオ"/>
                 <a:hlinkClick r:id="rId2"/>
               </a:rPr>
               <a:t>https://utokyo.enterprise.slack.com/</a:t>
             </a:r>
             <a:r>
-              <a:rPr lang="en-US" altLang="ja-JP" dirty="0">
+              <a:rPr lang="en-US" altLang="ja-JP">
                 <a:ea typeface="メイリオ"/>
               </a:rPr>
               <a:t> </a:t>
@@ -11910,19 +12334,19 @@
               <a:t>詳細な参加手順：</a:t>
             </a:r>
             <a:r>
-              <a:rPr lang="en-US" altLang="ja-JP" dirty="0">
+              <a:rPr lang="en-US" altLang="ja-JP">
                 <a:ea typeface="メイリオ"/>
               </a:rPr>
               <a:t> </a:t>
             </a:r>
             <a:r>
-              <a:rPr lang="en-US" altLang="ja-JP" dirty="0">
+              <a:rPr lang="en-US" altLang="ja-JP">
                 <a:ea typeface="メイリオ"/>
                 <a:hlinkClick r:id="rId3"/>
               </a:rPr>
               <a:t>https://utelecon.adm.u-tokyo.ac.jp/slack/join</a:t>
             </a:r>
-            <a:endParaRPr lang="ja-JP" altLang="en-US" dirty="0">
+            <a:endParaRPr lang="ja-JP" altLang="en-US">
               <a:ea typeface="メイリオ"/>
             </a:endParaRPr>
           </a:p>

</xml_diff>